<commit_message>
M3 Conference 2016 presentation updates
</commit_message>
<xml_diff>
--- a/A Swift Introduction to Swift.pptx
+++ b/A Swift Introduction to Swift.pptx
@@ -5,14 +5,15 @@
     <p:sldMasterId id="2147483744" r:id="rId1"/>
   </p:sldMasterIdLst>
   <p:notesMasterIdLst>
-    <p:notesMasterId r:id="rId7"/>
+    <p:notesMasterId r:id="rId8"/>
   </p:notesMasterIdLst>
   <p:sldIdLst>
     <p:sldId id="257" r:id="rId2"/>
-    <p:sldId id="306" r:id="rId3"/>
-    <p:sldId id="308" r:id="rId4"/>
-    <p:sldId id="305" r:id="rId5"/>
-    <p:sldId id="307" r:id="rId6"/>
+    <p:sldId id="310" r:id="rId3"/>
+    <p:sldId id="306" r:id="rId4"/>
+    <p:sldId id="308" r:id="rId5"/>
+    <p:sldId id="305" r:id="rId6"/>
+    <p:sldId id="307" r:id="rId7"/>
   </p:sldIdLst>
   <p:sldSz cx="9144000" cy="6858000" type="screen4x3"/>
   <p:notesSz cx="6858000" cy="9144000"/>
@@ -212,7 +213,7 @@
           <a:p>
             <a:fld id="{DE4C9721-1813-4A55-A5DA-76417DB5EE62}" type="datetimeFigureOut">
               <a:rPr lang="en-US" smtClean="0"/>
-              <a:t>7/24/16</a:t>
+              <a:t>7/28/16</a:t>
             </a:fld>
             <a:endParaRPr lang="en-US"/>
           </a:p>
@@ -794,7 +795,7 @@
           <a:p>
             <a:fld id="{1A6A9824-C09F-4166-9A2C-6C9FA577887A}" type="datetimeFigureOut">
               <a:rPr lang="en-US" smtClean="0"/>
-              <a:t>7/24/16</a:t>
+              <a:t>7/28/16</a:t>
             </a:fld>
             <a:endParaRPr lang="en-US"/>
           </a:p>
@@ -1004,7 +1005,7 @@
           <a:p>
             <a:fld id="{2A7CB402-B72D-3346-9EA5-354251120F9E}" type="datetimeFigureOut">
               <a:rPr lang="en-US" smtClean="0"/>
-              <a:t>7/24/16</a:t>
+              <a:t>7/28/16</a:t>
             </a:fld>
             <a:endParaRPr lang="en-US"/>
           </a:p>
@@ -1165,7 +1166,7 @@
           <a:p>
             <a:fld id="{2A7CB402-B72D-3346-9EA5-354251120F9E}" type="datetimeFigureOut">
               <a:rPr lang="en-US" smtClean="0"/>
-              <a:t>7/24/16</a:t>
+              <a:t>7/28/16</a:t>
             </a:fld>
             <a:endParaRPr lang="en-US"/>
           </a:p>
@@ -1388,7 +1389,7 @@
           <a:p>
             <a:fld id="{2A7CB402-B72D-3346-9EA5-354251120F9E}" type="datetimeFigureOut">
               <a:rPr lang="en-US" smtClean="0"/>
-              <a:t>7/24/16</a:t>
+              <a:t>7/28/16</a:t>
             </a:fld>
             <a:endParaRPr lang="en-US"/>
           </a:p>
@@ -1727,7 +1728,7 @@
           <a:p>
             <a:fld id="{2A7CB402-B72D-3346-9EA5-354251120F9E}" type="datetimeFigureOut">
               <a:rPr lang="en-US" smtClean="0"/>
-              <a:t>7/24/16</a:t>
+              <a:t>7/28/16</a:t>
             </a:fld>
             <a:endParaRPr lang="en-US"/>
           </a:p>
@@ -2105,7 +2106,7 @@
           <a:p>
             <a:fld id="{2A7CB402-B72D-3346-9EA5-354251120F9E}" type="datetimeFigureOut">
               <a:rPr lang="en-US" smtClean="0"/>
-              <a:t>7/24/16</a:t>
+              <a:t>7/28/16</a:t>
             </a:fld>
             <a:endParaRPr lang="en-US"/>
           </a:p>
@@ -2621,7 +2622,7 @@
           <a:p>
             <a:fld id="{2A7CB402-B72D-3346-9EA5-354251120F9E}" type="datetimeFigureOut">
               <a:rPr lang="en-US" smtClean="0"/>
-              <a:t>7/24/16</a:t>
+              <a:t>7/28/16</a:t>
             </a:fld>
             <a:endParaRPr lang="en-US"/>
           </a:p>
@@ -2789,7 +2790,7 @@
           <a:p>
             <a:fld id="{2A7CB402-B72D-3346-9EA5-354251120F9E}" type="datetimeFigureOut">
               <a:rPr lang="en-US" smtClean="0"/>
-              <a:t>7/24/16</a:t>
+              <a:t>7/28/16</a:t>
             </a:fld>
             <a:endParaRPr lang="en-US"/>
           </a:p>
@@ -2919,7 +2920,7 @@
           <a:p>
             <a:fld id="{2A7CB402-B72D-3346-9EA5-354251120F9E}" type="datetimeFigureOut">
               <a:rPr lang="en-US" smtClean="0"/>
-              <a:t>7/24/16</a:t>
+              <a:t>7/28/16</a:t>
             </a:fld>
             <a:endParaRPr lang="en-US"/>
           </a:p>
@@ -3267,7 +3268,7 @@
           <a:p>
             <a:fld id="{2A7CB402-B72D-3346-9EA5-354251120F9E}" type="datetimeFigureOut">
               <a:rPr lang="en-US" smtClean="0"/>
-              <a:t>7/24/16</a:t>
+              <a:t>7/28/16</a:t>
             </a:fld>
             <a:endParaRPr lang="en-US"/>
           </a:p>
@@ -3581,7 +3582,7 @@
           <a:p>
             <a:fld id="{2A7CB402-B72D-3346-9EA5-354251120F9E}" type="datetimeFigureOut">
               <a:rPr lang="en-US" smtClean="0"/>
-              <a:t>7/24/16</a:t>
+              <a:t>7/28/16</a:t>
             </a:fld>
             <a:endParaRPr lang="en-US"/>
           </a:p>
@@ -3805,7 +3806,7 @@
           <a:p>
             <a:fld id="{2A7CB402-B72D-3346-9EA5-354251120F9E}" type="datetimeFigureOut">
               <a:rPr lang="en-US" smtClean="0"/>
-              <a:t>7/24/16</a:t>
+              <a:t>7/28/16</a:t>
             </a:fld>
             <a:endParaRPr lang="en-US"/>
           </a:p>
@@ -4308,7 +4309,7 @@
           <a:p>
             <a:r>
               <a:rPr lang="en-US" dirty="0" smtClean="0"/>
-              <a:t>Agenda</a:t>
+              <a:t>Introduction</a:t>
             </a:r>
             <a:endParaRPr lang="en-US" dirty="0"/>
           </a:p>
@@ -4321,27 +4322,116 @@
             <a:spLocks noGrp="1"/>
           </p:cNvSpPr>
           <p:nvPr>
-            <p:ph sz="half" idx="1"/>
+            <p:ph idx="1"/>
           </p:nvPr>
         </p:nvSpPr>
         <p:spPr/>
         <p:txBody>
+          <a:bodyPr/>
+          <a:lstStyle/>
+          <a:p>
+            <a:r>
+              <a:rPr lang="en-US" dirty="0" smtClean="0"/>
+              <a:t>26+ year career</a:t>
+            </a:r>
+          </a:p>
+          <a:p>
+            <a:r>
+              <a:rPr lang="en-US" dirty="0" smtClean="0"/>
+              <a:t>Lots of development projects for multiple companies</a:t>
+            </a:r>
+          </a:p>
+          <a:p>
+            <a:pPr lvl="1"/>
+            <a:r>
+              <a:rPr lang="en-US" dirty="0" smtClean="0"/>
+              <a:t>IBM, Lexmark, Diebold, Limited Brands, Sterling Commerce, IBM (again), Leading EDJE, Improving</a:t>
+            </a:r>
+          </a:p>
+        </p:txBody>
+      </p:sp>
+    </p:spTree>
+    <p:extLst>
+      <p:ext uri="{BB962C8B-B14F-4D97-AF65-F5344CB8AC3E}">
+        <p14:creationId xmlns:p14="http://schemas.microsoft.com/office/powerpoint/2010/main" val="246996620"/>
+      </p:ext>
+    </p:extLst>
+  </p:cSld>
+  <p:clrMapOvr>
+    <a:masterClrMapping/>
+  </p:clrMapOvr>
+</p:sld>
+</file>
+
+<file path=ppt/slides/slide3.xml><?xml version="1.0" encoding="utf-8"?>
+<p:sld xmlns:a="http://schemas.openxmlformats.org/drawingml/2006/main" xmlns:r="http://schemas.openxmlformats.org/officeDocument/2006/relationships" xmlns:p="http://schemas.openxmlformats.org/presentationml/2006/main">
+  <p:cSld>
+    <p:spTree>
+      <p:nvGrpSpPr>
+        <p:cNvPr id="1" name=""/>
+        <p:cNvGrpSpPr/>
+        <p:nvPr/>
+      </p:nvGrpSpPr>
+      <p:grpSpPr>
+        <a:xfrm>
+          <a:off x="0" y="0"/>
+          <a:ext cx="0" cy="0"/>
+          <a:chOff x="0" y="0"/>
+          <a:chExt cx="0" cy="0"/>
+        </a:xfrm>
+      </p:grpSpPr>
+      <p:sp>
+        <p:nvSpPr>
+          <p:cNvPr id="2" name="Title 1"/>
+          <p:cNvSpPr>
+            <a:spLocks noGrp="1"/>
+          </p:cNvSpPr>
+          <p:nvPr>
+            <p:ph type="title"/>
+          </p:nvPr>
+        </p:nvSpPr>
+        <p:spPr/>
+        <p:txBody>
           <a:bodyPr>
-            <a:normAutofit fontScale="92500" lnSpcReduction="10000"/>
+            <a:normAutofit fontScale="90000"/>
           </a:bodyPr>
           <a:lstStyle/>
           <a:p>
             <a:r>
               <a:rPr lang="en-US" dirty="0" smtClean="0"/>
+              <a:t>Agenda</a:t>
+            </a:r>
+            <a:endParaRPr lang="en-US" dirty="0"/>
+          </a:p>
+        </p:txBody>
+      </p:sp>
+      <p:sp>
+        <p:nvSpPr>
+          <p:cNvPr id="3" name="Content Placeholder 2"/>
+          <p:cNvSpPr>
+            <a:spLocks noGrp="1"/>
+          </p:cNvSpPr>
+          <p:nvPr>
+            <p:ph sz="half" idx="1"/>
+          </p:nvPr>
+        </p:nvSpPr>
+        <p:spPr/>
+        <p:txBody>
+          <a:bodyPr>
+            <a:normAutofit/>
+          </a:bodyPr>
+          <a:lstStyle/>
+          <a:p>
+            <a:r>
+              <a:rPr lang="en-US" dirty="0" smtClean="0"/>
               <a:t>Variables and Constants</a:t>
             </a:r>
           </a:p>
           <a:p>
             <a:r>
               <a:rPr lang="en-US" dirty="0" smtClean="0"/>
-              <a:t>Data Types</a:t>
-            </a:r>
-            <a:endParaRPr lang="en-US" dirty="0" smtClean="0"/>
+              <a:t>Types</a:t>
+            </a:r>
           </a:p>
           <a:p>
             <a:r>
@@ -4352,19 +4442,7 @@
           <a:p>
             <a:r>
               <a:rPr lang="en-US" dirty="0" smtClean="0"/>
-              <a:t>String interpolation</a:t>
-            </a:r>
-          </a:p>
-          <a:p>
-            <a:r>
-              <a:rPr lang="en-US" dirty="0" smtClean="0"/>
-              <a:t>Arrays</a:t>
-            </a:r>
-          </a:p>
-          <a:p>
-            <a:r>
-              <a:rPr lang="en-US" dirty="0" smtClean="0"/>
-              <a:t>Dictionaries</a:t>
+              <a:t>Arrays and Dictionaries</a:t>
             </a:r>
           </a:p>
           <a:p>
@@ -4388,39 +4466,33 @@
           <a:p>
             <a:r>
               <a:rPr lang="en-US" dirty="0" smtClean="0"/>
-              <a:t>Functions</a:t>
-            </a:r>
-          </a:p>
+              <a:t>Functions and Closures</a:t>
+            </a:r>
+          </a:p>
+        </p:txBody>
+      </p:sp>
+      <p:sp>
+        <p:nvSpPr>
+          <p:cNvPr id="4" name="Content Placeholder 3"/>
+          <p:cNvSpPr>
+            <a:spLocks noGrp="1"/>
+          </p:cNvSpPr>
+          <p:nvPr>
+            <p:ph sz="half" idx="2"/>
+          </p:nvPr>
+        </p:nvSpPr>
+        <p:spPr/>
+        <p:txBody>
+          <a:bodyPr>
+            <a:normAutofit/>
+          </a:bodyPr>
+          <a:lstStyle/>
           <a:p>
             <a:r>
               <a:rPr lang="en-US" dirty="0" err="1" smtClean="0"/>
               <a:t>Optionals</a:t>
             </a:r>
-            <a:endParaRPr lang="en-US" dirty="0"/>
-          </a:p>
-        </p:txBody>
-      </p:sp>
-      <p:sp>
-        <p:nvSpPr>
-          <p:cNvPr id="4" name="Content Placeholder 3"/>
-          <p:cNvSpPr>
-            <a:spLocks noGrp="1"/>
-          </p:cNvSpPr>
-          <p:nvPr>
-            <p:ph sz="half" idx="2"/>
-          </p:nvPr>
-        </p:nvSpPr>
-        <p:spPr/>
-        <p:txBody>
-          <a:bodyPr>
-            <a:normAutofit fontScale="92500" lnSpcReduction="10000"/>
-          </a:bodyPr>
-          <a:lstStyle/>
-          <a:p>
-            <a:r>
-              <a:rPr lang="en-US" dirty="0" smtClean="0"/>
-              <a:t>Optional chaining</a:t>
-            </a:r>
+            <a:endParaRPr lang="en-US" dirty="0" smtClean="0"/>
           </a:p>
           <a:p>
             <a:r>
@@ -4458,29 +4530,6 @@
               <a:rPr lang="en-US" dirty="0" smtClean="0"/>
               <a:t>Access control</a:t>
             </a:r>
-          </a:p>
-          <a:p>
-            <a:r>
-              <a:rPr lang="en-US" dirty="0" smtClean="0"/>
-              <a:t>Type casting</a:t>
-            </a:r>
-          </a:p>
-          <a:p>
-            <a:r>
-              <a:rPr lang="en-US" dirty="0" smtClean="0"/>
-              <a:t>Closers</a:t>
-            </a:r>
-          </a:p>
-          <a:p>
-            <a:r>
-              <a:rPr lang="en-US" dirty="0" smtClean="0"/>
-              <a:t>Doc </a:t>
-            </a:r>
-            <a:r>
-              <a:rPr lang="en-US" dirty="0" smtClean="0"/>
-              <a:t>comments</a:t>
-            </a:r>
-            <a:endParaRPr lang="en-US" dirty="0"/>
           </a:p>
         </p:txBody>
       </p:sp>
@@ -4504,90 +4553,6 @@
 </p:sld>
 </file>
 
-<file path=ppt/slides/slide3.xml><?xml version="1.0" encoding="utf-8"?>
-<p:sld xmlns:a="http://schemas.openxmlformats.org/drawingml/2006/main" xmlns:r="http://schemas.openxmlformats.org/officeDocument/2006/relationships" xmlns:p="http://schemas.openxmlformats.org/presentationml/2006/main">
-  <p:cSld>
-    <p:spTree>
-      <p:nvGrpSpPr>
-        <p:cNvPr id="1" name=""/>
-        <p:cNvGrpSpPr/>
-        <p:nvPr/>
-      </p:nvGrpSpPr>
-      <p:grpSpPr>
-        <a:xfrm>
-          <a:off x="0" y="0"/>
-          <a:ext cx="0" cy="0"/>
-          <a:chOff x="0" y="0"/>
-          <a:chExt cx="0" cy="0"/>
-        </a:xfrm>
-      </p:grpSpPr>
-      <p:sp>
-        <p:nvSpPr>
-          <p:cNvPr id="2" name="Title 1"/>
-          <p:cNvSpPr>
-            <a:spLocks noGrp="1"/>
-          </p:cNvSpPr>
-          <p:nvPr>
-            <p:ph type="title"/>
-          </p:nvPr>
-        </p:nvSpPr>
-        <p:spPr/>
-        <p:txBody>
-          <a:bodyPr>
-            <a:normAutofit fontScale="90000"/>
-          </a:bodyPr>
-          <a:lstStyle/>
-          <a:p>
-            <a:r>
-              <a:rPr lang="en-US" dirty="0" smtClean="0"/>
-              <a:t>No more slides</a:t>
-            </a:r>
-            <a:endParaRPr lang="en-US" dirty="0"/>
-          </a:p>
-        </p:txBody>
-      </p:sp>
-      <p:sp>
-        <p:nvSpPr>
-          <p:cNvPr id="3" name="Content Placeholder 2"/>
-          <p:cNvSpPr>
-            <a:spLocks noGrp="1"/>
-          </p:cNvSpPr>
-          <p:nvPr>
-            <p:ph idx="1"/>
-          </p:nvPr>
-        </p:nvSpPr>
-        <p:spPr/>
-        <p:txBody>
-          <a:bodyPr/>
-          <a:lstStyle/>
-          <a:p>
-            <a:r>
-              <a:rPr lang="en-US" dirty="0" smtClean="0"/>
-              <a:t>Open Xcode</a:t>
-            </a:r>
-          </a:p>
-          <a:p>
-            <a:r>
-              <a:rPr lang="en-US" dirty="0" smtClean="0"/>
-              <a:t>Start a new playground to follow along and experiment</a:t>
-            </a:r>
-            <a:endParaRPr lang="en-US" dirty="0"/>
-          </a:p>
-        </p:txBody>
-      </p:sp>
-    </p:spTree>
-    <p:extLst>
-      <p:ext uri="{BB962C8B-B14F-4D97-AF65-F5344CB8AC3E}">
-        <p14:creationId xmlns:p14="http://schemas.microsoft.com/office/powerpoint/2010/main" val="1974355100"/>
-      </p:ext>
-    </p:extLst>
-  </p:cSld>
-  <p:clrMapOvr>
-    <a:masterClrMapping/>
-  </p:clrMapOvr>
-</p:sld>
-</file>
-
 <file path=ppt/slides/slide4.xml><?xml version="1.0" encoding="utf-8"?>
 <p:sld xmlns:a="http://schemas.openxmlformats.org/drawingml/2006/main" xmlns:r="http://schemas.openxmlformats.org/officeDocument/2006/relationships" xmlns:p="http://schemas.openxmlformats.org/presentationml/2006/main">
   <p:cSld>
@@ -4624,6 +4589,90 @@
           <a:p>
             <a:r>
               <a:rPr lang="en-US" dirty="0" smtClean="0"/>
+              <a:t>No more slides</a:t>
+            </a:r>
+            <a:endParaRPr lang="en-US" dirty="0"/>
+          </a:p>
+        </p:txBody>
+      </p:sp>
+      <p:sp>
+        <p:nvSpPr>
+          <p:cNvPr id="3" name="Content Placeholder 2"/>
+          <p:cNvSpPr>
+            <a:spLocks noGrp="1"/>
+          </p:cNvSpPr>
+          <p:nvPr>
+            <p:ph idx="1"/>
+          </p:nvPr>
+        </p:nvSpPr>
+        <p:spPr/>
+        <p:txBody>
+          <a:bodyPr/>
+          <a:lstStyle/>
+          <a:p>
+            <a:r>
+              <a:rPr lang="en-US" dirty="0" smtClean="0"/>
+              <a:t>Open Xcode</a:t>
+            </a:r>
+          </a:p>
+          <a:p>
+            <a:r>
+              <a:rPr lang="en-US" dirty="0" smtClean="0"/>
+              <a:t>Start a new playground to follow along and experiment</a:t>
+            </a:r>
+            <a:endParaRPr lang="en-US" dirty="0"/>
+          </a:p>
+        </p:txBody>
+      </p:sp>
+    </p:spTree>
+    <p:extLst>
+      <p:ext uri="{BB962C8B-B14F-4D97-AF65-F5344CB8AC3E}">
+        <p14:creationId xmlns:p14="http://schemas.microsoft.com/office/powerpoint/2010/main" val="1974355100"/>
+      </p:ext>
+    </p:extLst>
+  </p:cSld>
+  <p:clrMapOvr>
+    <a:masterClrMapping/>
+  </p:clrMapOvr>
+</p:sld>
+</file>
+
+<file path=ppt/slides/slide5.xml><?xml version="1.0" encoding="utf-8"?>
+<p:sld xmlns:a="http://schemas.openxmlformats.org/drawingml/2006/main" xmlns:r="http://schemas.openxmlformats.org/officeDocument/2006/relationships" xmlns:p="http://schemas.openxmlformats.org/presentationml/2006/main">
+  <p:cSld>
+    <p:spTree>
+      <p:nvGrpSpPr>
+        <p:cNvPr id="1" name=""/>
+        <p:cNvGrpSpPr/>
+        <p:nvPr/>
+      </p:nvGrpSpPr>
+      <p:grpSpPr>
+        <a:xfrm>
+          <a:off x="0" y="0"/>
+          <a:ext cx="0" cy="0"/>
+          <a:chOff x="0" y="0"/>
+          <a:chExt cx="0" cy="0"/>
+        </a:xfrm>
+      </p:grpSpPr>
+      <p:sp>
+        <p:nvSpPr>
+          <p:cNvPr id="2" name="Title 1"/>
+          <p:cNvSpPr>
+            <a:spLocks noGrp="1"/>
+          </p:cNvSpPr>
+          <p:nvPr>
+            <p:ph type="title"/>
+          </p:nvPr>
+        </p:nvSpPr>
+        <p:spPr/>
+        <p:txBody>
+          <a:bodyPr>
+            <a:normAutofit fontScale="90000"/>
+          </a:bodyPr>
+          <a:lstStyle/>
+          <a:p>
+            <a:r>
+              <a:rPr lang="en-US" dirty="0" smtClean="0"/>
               <a:t>Additional Info</a:t>
             </a:r>
             <a:endParaRPr lang="en-US" dirty="0"/>
@@ -4671,10 +4720,6 @@
               <a:rPr lang="en-US" dirty="0" smtClean="0"/>
               <a:t>Language (Swift 2.2)</a:t>
             </a:r>
-            <a:r>
-              <a:rPr lang="en-US" dirty="0" smtClean="0"/>
-              <a:t/>
-            </a:r>
             <a:br>
               <a:rPr lang="en-US" dirty="0" smtClean="0"/>
             </a:br>
@@ -4723,11 +4768,7 @@
             <a:pPr lvl="1"/>
             <a:r>
               <a:rPr lang="en-US" dirty="0" smtClean="0"/>
-              <a:t>Using </a:t>
-            </a:r>
-            <a:r>
-              <a:rPr lang="en-US" dirty="0" smtClean="0"/>
-              <a:t>Swift with Cocoa </a:t>
+              <a:t>Using Swift with Cocoa </a:t>
             </a:r>
             <a:r>
               <a:rPr lang="en-US" dirty="0"/>
@@ -4886,7 +4927,7 @@
 </p:sld>
 </file>
 
-<file path=ppt/slides/slide5.xml><?xml version="1.0" encoding="utf-8"?>
+<file path=ppt/slides/slide6.xml><?xml version="1.0" encoding="utf-8"?>
 <p:sld xmlns:a="http://schemas.openxmlformats.org/drawingml/2006/main" xmlns:r="http://schemas.openxmlformats.org/officeDocument/2006/relationships" xmlns:p="http://schemas.openxmlformats.org/presentationml/2006/main">
   <p:cSld>
     <p:spTree>
@@ -4991,22 +5032,14 @@
           <a:p>
             <a:r>
               <a:rPr lang="en-US" dirty="0" smtClean="0"/>
-              <a:t>Twitter</a:t>
-            </a:r>
-            <a:r>
-              <a:rPr lang="en-US" dirty="0" smtClean="0"/>
-              <a:t>:</a:t>
+              <a:t>Twitter:</a:t>
             </a:r>
             <a:br>
               <a:rPr lang="en-US" dirty="0" smtClean="0"/>
             </a:br>
             <a:r>
               <a:rPr lang="en-US" dirty="0" smtClean="0"/>
-              <a:t>@</a:t>
-            </a:r>
-            <a:r>
-              <a:rPr lang="en-US" dirty="0" smtClean="0"/>
-              <a:t>jkwuc89</a:t>
+              <a:t>@jkwuc89</a:t>
             </a:r>
           </a:p>
           <a:p>

</xml_diff>

<commit_message>
Added slidedeck for A Swift Presentation to Swift
</commit_message>
<xml_diff>
--- a/A Swift Introduction to Swift.pptx
+++ b/A Swift Introduction to Swift.pptx
@@ -5,15 +5,17 @@
     <p:sldMasterId id="2147483744" r:id="rId1"/>
   </p:sldMasterIdLst>
   <p:notesMasterIdLst>
-    <p:notesMasterId r:id="rId8"/>
+    <p:notesMasterId r:id="rId10"/>
   </p:notesMasterIdLst>
   <p:sldIdLst>
-    <p:sldId id="257" r:id="rId2"/>
-    <p:sldId id="310" r:id="rId3"/>
-    <p:sldId id="306" r:id="rId4"/>
-    <p:sldId id="308" r:id="rId5"/>
-    <p:sldId id="305" r:id="rId6"/>
-    <p:sldId id="307" r:id="rId7"/>
+    <p:sldId id="312" r:id="rId2"/>
+    <p:sldId id="257" r:id="rId3"/>
+    <p:sldId id="310" r:id="rId4"/>
+    <p:sldId id="311" r:id="rId5"/>
+    <p:sldId id="306" r:id="rId6"/>
+    <p:sldId id="308" r:id="rId7"/>
+    <p:sldId id="305" r:id="rId8"/>
+    <p:sldId id="307" r:id="rId9"/>
   </p:sldIdLst>
   <p:sldSz cx="9144000" cy="6858000" type="screen4x3"/>
   <p:notesSz cx="6858000" cy="9144000"/>
@@ -213,7 +215,7 @@
           <a:p>
             <a:fld id="{DE4C9721-1813-4A55-A5DA-76417DB5EE62}" type="datetimeFigureOut">
               <a:rPr lang="en-US" smtClean="0"/>
-              <a:t>7/28/16</a:t>
+              <a:t>8/5/16</a:t>
             </a:fld>
             <a:endParaRPr lang="en-US"/>
           </a:p>
@@ -558,7 +560,7 @@
           <a:p>
             <a:fld id="{3A09ECF4-2FF5-41AA-8B53-E32E4ADBE53E}" type="slidenum">
               <a:rPr lang="en-US" smtClean="0"/>
-              <a:t>1</a:t>
+              <a:t>2</a:t>
             </a:fld>
             <a:endParaRPr lang="en-US"/>
           </a:p>
@@ -795,7 +797,7 @@
           <a:p>
             <a:fld id="{1A6A9824-C09F-4166-9A2C-6C9FA577887A}" type="datetimeFigureOut">
               <a:rPr lang="en-US" smtClean="0"/>
-              <a:t>7/28/16</a:t>
+              <a:t>8/5/16</a:t>
             </a:fld>
             <a:endParaRPr lang="en-US"/>
           </a:p>
@@ -1005,7 +1007,7 @@
           <a:p>
             <a:fld id="{2A7CB402-B72D-3346-9EA5-354251120F9E}" type="datetimeFigureOut">
               <a:rPr lang="en-US" smtClean="0"/>
-              <a:t>7/28/16</a:t>
+              <a:t>8/5/16</a:t>
             </a:fld>
             <a:endParaRPr lang="en-US"/>
           </a:p>
@@ -1166,7 +1168,7 @@
           <a:p>
             <a:fld id="{2A7CB402-B72D-3346-9EA5-354251120F9E}" type="datetimeFigureOut">
               <a:rPr lang="en-US" smtClean="0"/>
-              <a:t>7/28/16</a:t>
+              <a:t>8/5/16</a:t>
             </a:fld>
             <a:endParaRPr lang="en-US"/>
           </a:p>
@@ -1389,7 +1391,7 @@
           <a:p>
             <a:fld id="{2A7CB402-B72D-3346-9EA5-354251120F9E}" type="datetimeFigureOut">
               <a:rPr lang="en-US" smtClean="0"/>
-              <a:t>7/28/16</a:t>
+              <a:t>8/5/16</a:t>
             </a:fld>
             <a:endParaRPr lang="en-US"/>
           </a:p>
@@ -1728,7 +1730,7 @@
           <a:p>
             <a:fld id="{2A7CB402-B72D-3346-9EA5-354251120F9E}" type="datetimeFigureOut">
               <a:rPr lang="en-US" smtClean="0"/>
-              <a:t>7/28/16</a:t>
+              <a:t>8/5/16</a:t>
             </a:fld>
             <a:endParaRPr lang="en-US"/>
           </a:p>
@@ -2106,7 +2108,7 @@
           <a:p>
             <a:fld id="{2A7CB402-B72D-3346-9EA5-354251120F9E}" type="datetimeFigureOut">
               <a:rPr lang="en-US" smtClean="0"/>
-              <a:t>7/28/16</a:t>
+              <a:t>8/5/16</a:t>
             </a:fld>
             <a:endParaRPr lang="en-US"/>
           </a:p>
@@ -2622,7 +2624,7 @@
           <a:p>
             <a:fld id="{2A7CB402-B72D-3346-9EA5-354251120F9E}" type="datetimeFigureOut">
               <a:rPr lang="en-US" smtClean="0"/>
-              <a:t>7/28/16</a:t>
+              <a:t>8/5/16</a:t>
             </a:fld>
             <a:endParaRPr lang="en-US"/>
           </a:p>
@@ -2790,7 +2792,7 @@
           <a:p>
             <a:fld id="{2A7CB402-B72D-3346-9EA5-354251120F9E}" type="datetimeFigureOut">
               <a:rPr lang="en-US" smtClean="0"/>
-              <a:t>7/28/16</a:t>
+              <a:t>8/5/16</a:t>
             </a:fld>
             <a:endParaRPr lang="en-US"/>
           </a:p>
@@ -2920,7 +2922,7 @@
           <a:p>
             <a:fld id="{2A7CB402-B72D-3346-9EA5-354251120F9E}" type="datetimeFigureOut">
               <a:rPr lang="en-US" smtClean="0"/>
-              <a:t>7/28/16</a:t>
+              <a:t>8/5/16</a:t>
             </a:fld>
             <a:endParaRPr lang="en-US"/>
           </a:p>
@@ -3268,7 +3270,7 @@
           <a:p>
             <a:fld id="{2A7CB402-B72D-3346-9EA5-354251120F9E}" type="datetimeFigureOut">
               <a:rPr lang="en-US" smtClean="0"/>
-              <a:t>7/28/16</a:t>
+              <a:t>8/5/16</a:t>
             </a:fld>
             <a:endParaRPr lang="en-US"/>
           </a:p>
@@ -3582,7 +3584,7 @@
           <a:p>
             <a:fld id="{2A7CB402-B72D-3346-9EA5-354251120F9E}" type="datetimeFigureOut">
               <a:rPr lang="en-US" smtClean="0"/>
-              <a:t>7/28/16</a:t>
+              <a:t>8/5/16</a:t>
             </a:fld>
             <a:endParaRPr lang="en-US"/>
           </a:p>
@@ -3806,7 +3808,7 @@
           <a:p>
             <a:fld id="{2A7CB402-B72D-3346-9EA5-354251120F9E}" type="datetimeFigureOut">
               <a:rPr lang="en-US" smtClean="0"/>
-              <a:t>7/28/16</a:t>
+              <a:t>8/5/16</a:t>
             </a:fld>
             <a:endParaRPr lang="en-US"/>
           </a:p>
@@ -4176,6 +4178,162 @@
       </p:grpSpPr>
       <p:sp>
         <p:nvSpPr>
+          <p:cNvPr id="2" name="Title 1"/>
+          <p:cNvSpPr>
+            <a:spLocks noGrp="1"/>
+          </p:cNvSpPr>
+          <p:nvPr>
+            <p:ph type="title"/>
+          </p:nvPr>
+        </p:nvSpPr>
+        <p:spPr/>
+        <p:txBody>
+          <a:bodyPr>
+            <a:normAutofit fontScale="90000"/>
+          </a:bodyPr>
+          <a:lstStyle/>
+          <a:p>
+            <a:r>
+              <a:rPr lang="en-US" dirty="0" smtClean="0"/>
+              <a:t>Prerequisites</a:t>
+            </a:r>
+            <a:endParaRPr lang="en-US" dirty="0"/>
+          </a:p>
+        </p:txBody>
+      </p:sp>
+      <p:sp>
+        <p:nvSpPr>
+          <p:cNvPr id="3" name="Content Placeholder 2"/>
+          <p:cNvSpPr>
+            <a:spLocks noGrp="1"/>
+          </p:cNvSpPr>
+          <p:nvPr>
+            <p:ph idx="1"/>
+          </p:nvPr>
+        </p:nvSpPr>
+        <p:spPr/>
+        <p:txBody>
+          <a:bodyPr/>
+          <a:lstStyle/>
+          <a:p>
+            <a:r>
+              <a:rPr lang="en-US" dirty="0">
+                <a:hlinkClick r:id="rId2"/>
+              </a:rPr>
+              <a:t>https://</a:t>
+            </a:r>
+            <a:r>
+              <a:rPr lang="en-US" dirty="0" smtClean="0">
+                <a:hlinkClick r:id="rId2"/>
+              </a:rPr>
+              <a:t>github.com/jkwuc89/SwiftPlaygrounds</a:t>
+            </a:r>
+            <a:endParaRPr lang="en-US" dirty="0" smtClean="0"/>
+          </a:p>
+          <a:p>
+            <a:r>
+              <a:rPr lang="en-US" dirty="0"/>
+              <a:t>Inside Swift Introduction to </a:t>
+            </a:r>
+            <a:r>
+              <a:rPr lang="en-US" dirty="0" smtClean="0"/>
+              <a:t>Swift directory:</a:t>
+            </a:r>
+          </a:p>
+          <a:p>
+            <a:pPr lvl="1"/>
+            <a:r>
+              <a:rPr lang="en-US" dirty="0"/>
+              <a:t>Arrays and Dictionaries</a:t>
+            </a:r>
+          </a:p>
+          <a:p>
+            <a:pPr lvl="1"/>
+            <a:r>
+              <a:rPr lang="en-US" dirty="0"/>
+              <a:t>Conditionals Loops and Switches</a:t>
+            </a:r>
+          </a:p>
+          <a:p>
+            <a:pPr lvl="1"/>
+            <a:r>
+              <a:rPr lang="en-US" dirty="0"/>
+              <a:t>Enumerations Classes and </a:t>
+            </a:r>
+            <a:r>
+              <a:rPr lang="en-US" dirty="0" err="1"/>
+              <a:t>Structs</a:t>
+            </a:r>
+            <a:endParaRPr lang="en-US" dirty="0"/>
+          </a:p>
+          <a:p>
+            <a:pPr lvl="1"/>
+            <a:r>
+              <a:rPr lang="en-US" dirty="0"/>
+              <a:t>Functions and Closures</a:t>
+            </a:r>
+          </a:p>
+          <a:p>
+            <a:pPr lvl="1"/>
+            <a:r>
+              <a:rPr lang="en-US"/>
+              <a:t>Variables </a:t>
+            </a:r>
+            <a:r>
+              <a:rPr lang="en-US" smtClean="0"/>
+              <a:t>Constants </a:t>
+            </a:r>
+            <a:r>
+              <a:rPr lang="en-US" dirty="0"/>
+              <a:t>Types and Operators</a:t>
+            </a:r>
+          </a:p>
+          <a:p>
+            <a:r>
+              <a:rPr lang="en-US" dirty="0" smtClean="0"/>
+              <a:t>Xcode</a:t>
+            </a:r>
+          </a:p>
+          <a:p>
+            <a:pPr marL="0" indent="0">
+              <a:buNone/>
+            </a:pPr>
+            <a:endParaRPr lang="en-US" dirty="0"/>
+          </a:p>
+        </p:txBody>
+      </p:sp>
+    </p:spTree>
+    <p:extLst>
+      <p:ext uri="{BB962C8B-B14F-4D97-AF65-F5344CB8AC3E}">
+        <p14:creationId xmlns:p14="http://schemas.microsoft.com/office/powerpoint/2010/main" val="1487907363"/>
+      </p:ext>
+    </p:extLst>
+  </p:cSld>
+  <p:clrMapOvr>
+    <a:masterClrMapping/>
+  </p:clrMapOvr>
+</p:sld>
+</file>
+
+<file path=ppt/slides/slide2.xml><?xml version="1.0" encoding="utf-8"?>
+<p:sld xmlns:a="http://schemas.openxmlformats.org/drawingml/2006/main" xmlns:r="http://schemas.openxmlformats.org/officeDocument/2006/relationships" xmlns:p="http://schemas.openxmlformats.org/presentationml/2006/main">
+  <p:cSld>
+    <p:spTree>
+      <p:nvGrpSpPr>
+        <p:cNvPr id="1" name=""/>
+        <p:cNvGrpSpPr/>
+        <p:nvPr/>
+      </p:nvGrpSpPr>
+      <p:grpSpPr>
+        <a:xfrm>
+          <a:off x="0" y="0"/>
+          <a:ext cx="0" cy="0"/>
+          <a:chOff x="0" y="0"/>
+          <a:chExt cx="0" cy="0"/>
+        </a:xfrm>
+      </p:grpSpPr>
+      <p:sp>
+        <p:nvSpPr>
           <p:cNvPr id="4" name="Title 3"/>
           <p:cNvSpPr>
             <a:spLocks noGrp="1"/>
@@ -4273,96 +4431,6 @@
 </p:sld>
 </file>
 
-<file path=ppt/slides/slide2.xml><?xml version="1.0" encoding="utf-8"?>
-<p:sld xmlns:a="http://schemas.openxmlformats.org/drawingml/2006/main" xmlns:r="http://schemas.openxmlformats.org/officeDocument/2006/relationships" xmlns:p="http://schemas.openxmlformats.org/presentationml/2006/main">
-  <p:cSld>
-    <p:spTree>
-      <p:nvGrpSpPr>
-        <p:cNvPr id="1" name=""/>
-        <p:cNvGrpSpPr/>
-        <p:nvPr/>
-      </p:nvGrpSpPr>
-      <p:grpSpPr>
-        <a:xfrm>
-          <a:off x="0" y="0"/>
-          <a:ext cx="0" cy="0"/>
-          <a:chOff x="0" y="0"/>
-          <a:chExt cx="0" cy="0"/>
-        </a:xfrm>
-      </p:grpSpPr>
-      <p:sp>
-        <p:nvSpPr>
-          <p:cNvPr id="2" name="Title 1"/>
-          <p:cNvSpPr>
-            <a:spLocks noGrp="1"/>
-          </p:cNvSpPr>
-          <p:nvPr>
-            <p:ph type="title"/>
-          </p:nvPr>
-        </p:nvSpPr>
-        <p:spPr/>
-        <p:txBody>
-          <a:bodyPr>
-            <a:normAutofit fontScale="90000"/>
-          </a:bodyPr>
-          <a:lstStyle/>
-          <a:p>
-            <a:r>
-              <a:rPr lang="en-US" dirty="0" smtClean="0"/>
-              <a:t>Introduction</a:t>
-            </a:r>
-            <a:endParaRPr lang="en-US" dirty="0"/>
-          </a:p>
-        </p:txBody>
-      </p:sp>
-      <p:sp>
-        <p:nvSpPr>
-          <p:cNvPr id="3" name="Content Placeholder 2"/>
-          <p:cNvSpPr>
-            <a:spLocks noGrp="1"/>
-          </p:cNvSpPr>
-          <p:nvPr>
-            <p:ph idx="1"/>
-          </p:nvPr>
-        </p:nvSpPr>
-        <p:spPr/>
-        <p:txBody>
-          <a:bodyPr/>
-          <a:lstStyle/>
-          <a:p>
-            <a:r>
-              <a:rPr lang="en-US" dirty="0" smtClean="0"/>
-              <a:t>26+ year career</a:t>
-            </a:r>
-          </a:p>
-          <a:p>
-            <a:r>
-              <a:rPr lang="en-US" dirty="0" smtClean="0"/>
-              <a:t>Lots of development projects for multiple companies</a:t>
-            </a:r>
-          </a:p>
-          <a:p>
-            <a:pPr lvl="1"/>
-            <a:r>
-              <a:rPr lang="en-US" dirty="0" smtClean="0"/>
-              <a:t>IBM, Lexmark, Diebold, Limited Brands, Sterling Commerce, IBM (again), Leading EDJE, Improving</a:t>
-            </a:r>
-          </a:p>
-        </p:txBody>
-      </p:sp>
-    </p:spTree>
-    <p:extLst>
-      <p:ext uri="{BB962C8B-B14F-4D97-AF65-F5344CB8AC3E}">
-        <p14:creationId xmlns:p14="http://schemas.microsoft.com/office/powerpoint/2010/main" val="246996620"/>
-      </p:ext>
-    </p:extLst>
-  </p:cSld>
-  <p:clrMapOvr>
-    <a:masterClrMapping/>
-  </p:clrMapOvr>
-</p:sld>
-</file>
-
 <file path=ppt/slides/slide3.xml><?xml version="1.0" encoding="utf-8"?>
 <p:sld xmlns:a="http://schemas.openxmlformats.org/drawingml/2006/main" xmlns:r="http://schemas.openxmlformats.org/officeDocument/2006/relationships" xmlns:p="http://schemas.openxmlformats.org/presentationml/2006/main">
   <p:cSld>
@@ -4399,7 +4467,7 @@
           <a:p>
             <a:r>
               <a:rPr lang="en-US" dirty="0" smtClean="0"/>
-              <a:t>Agenda</a:t>
+              <a:t>About Me</a:t>
             </a:r>
             <a:endParaRPr lang="en-US" dirty="0"/>
           </a:p>
@@ -4412,144 +4480,120 @@
             <a:spLocks noGrp="1"/>
           </p:cNvSpPr>
           <p:nvPr>
-            <p:ph sz="half" idx="1"/>
+            <p:ph idx="1"/>
           </p:nvPr>
         </p:nvSpPr>
         <p:spPr/>
         <p:txBody>
           <a:bodyPr>
-            <a:normAutofit/>
+            <a:normAutofit fontScale="77500" lnSpcReduction="20000"/>
           </a:bodyPr>
           <a:lstStyle/>
           <a:p>
             <a:r>
               <a:rPr lang="en-US" dirty="0" smtClean="0"/>
-              <a:t>Variables and Constants</a:t>
-            </a:r>
-          </a:p>
-          <a:p>
+              <a:t>Over </a:t>
+            </a:r>
+            <a:r>
+              <a:rPr lang="en-US" dirty="0"/>
+              <a:t>26 years experience architecting, designing, developing and delivering high quality software solutions for several companies including Diebold, IBM, Lexmark, Limited Brands, Ohio State, and Sterling </a:t>
+            </a:r>
             <a:r>
               <a:rPr lang="en-US" dirty="0" smtClean="0"/>
-              <a:t>Types</a:t>
+              <a:t>Commerce.</a:t>
             </a:r>
           </a:p>
           <a:p>
             <a:r>
               <a:rPr lang="en-US" dirty="0" smtClean="0"/>
-              <a:t>Operators</a:t>
-            </a:r>
-          </a:p>
-          <a:p>
+              <a:t>Very </a:t>
+            </a:r>
+            <a:r>
+              <a:rPr lang="en-US" dirty="0"/>
+              <a:t>passionate about architecting and developing software solutions that deliver exceptional ROI to </a:t>
+            </a:r>
             <a:r>
               <a:rPr lang="en-US" dirty="0" smtClean="0"/>
-              <a:t>Arrays and Dictionaries</a:t>
+              <a:t>my clients.</a:t>
             </a:r>
           </a:p>
           <a:p>
             <a:r>
               <a:rPr lang="en-US" dirty="0" smtClean="0"/>
-              <a:t>Conditional statements</a:t>
-            </a:r>
-          </a:p>
-          <a:p>
+              <a:t>Presented </a:t>
+            </a:r>
+            <a:r>
+              <a:rPr lang="en-US" dirty="0"/>
+              <a:t>at CodeMash, Code </a:t>
+            </a:r>
+            <a:r>
+              <a:rPr lang="en-US" dirty="0" err="1"/>
+              <a:t>PaLOUsa</a:t>
+            </a:r>
+            <a:r>
+              <a:rPr lang="en-US" dirty="0"/>
+              <a:t>, Columbus Code Camp, M3, Path to Agility, StirTrek, and That Conference</a:t>
+            </a:r>
             <a:r>
               <a:rPr lang="en-US" dirty="0" smtClean="0"/>
-              <a:t>Loops</a:t>
+              <a:t>.</a:t>
             </a:r>
           </a:p>
           <a:p>
             <a:r>
               <a:rPr lang="en-US" dirty="0" smtClean="0"/>
-              <a:t>Switch case</a:t>
-            </a:r>
-          </a:p>
-          <a:p>
+              <a:t>When </a:t>
+            </a:r>
+            <a:r>
+              <a:rPr lang="en-US" dirty="0"/>
+              <a:t>not at work, e</a:t>
+            </a:r>
             <a:r>
               <a:rPr lang="en-US" dirty="0" smtClean="0"/>
-              <a:t>Functions and Closures</a:t>
-            </a:r>
-          </a:p>
-        </p:txBody>
-      </p:sp>
-      <p:sp>
-        <p:nvSpPr>
-          <p:cNvPr id="4" name="Content Placeholder 3"/>
-          <p:cNvSpPr>
-            <a:spLocks noGrp="1"/>
-          </p:cNvSpPr>
-          <p:nvPr>
-            <p:ph sz="half" idx="2"/>
-          </p:nvPr>
-        </p:nvSpPr>
-        <p:spPr/>
-        <p:txBody>
-          <a:bodyPr>
-            <a:normAutofit/>
-          </a:bodyPr>
-          <a:lstStyle/>
-          <a:p>
-            <a:r>
-              <a:rPr lang="en-US" dirty="0" err="1" smtClean="0"/>
-              <a:t>Optionals</a:t>
+              <a:t>njoys </a:t>
+            </a:r>
+            <a:r>
+              <a:rPr lang="en-US" dirty="0"/>
+              <a:t>dining and traveling with </a:t>
+            </a:r>
+            <a:r>
+              <a:rPr lang="en-US" dirty="0" smtClean="0"/>
+              <a:t>my beautiful </a:t>
+            </a:r>
+            <a:r>
+              <a:rPr lang="en-US" dirty="0"/>
+              <a:t>wife Karen, craft beer and spending time when </a:t>
+            </a:r>
+            <a:r>
+              <a:rPr lang="en-US" dirty="0" smtClean="0"/>
+              <a:t>I can </a:t>
+            </a:r>
+            <a:r>
+              <a:rPr lang="en-US" dirty="0"/>
+              <a:t>with </a:t>
+            </a:r>
+            <a:r>
+              <a:rPr lang="en-US" dirty="0" smtClean="0"/>
+              <a:t>my two </a:t>
+            </a:r>
+            <a:r>
+              <a:rPr lang="en-US" dirty="0"/>
+              <a:t>daughters who are currently away at college.</a:t>
             </a:r>
             <a:endParaRPr lang="en-US" dirty="0" smtClean="0"/>
-          </a:p>
-          <a:p>
-            <a:r>
-              <a:rPr lang="en-US" dirty="0" smtClean="0"/>
-              <a:t>Enumerations</a:t>
-            </a:r>
-          </a:p>
-          <a:p>
-            <a:r>
-              <a:rPr lang="en-US" dirty="0" err="1" smtClean="0"/>
-              <a:t>Structs</a:t>
-            </a:r>
-            <a:endParaRPr lang="en-US" dirty="0" smtClean="0"/>
-          </a:p>
-          <a:p>
-            <a:r>
-              <a:rPr lang="en-US" dirty="0" smtClean="0"/>
-              <a:t>Classes</a:t>
-            </a:r>
-          </a:p>
-          <a:p>
-            <a:r>
-              <a:rPr lang="en-US" dirty="0" smtClean="0"/>
-              <a:t>Properties</a:t>
-            </a:r>
-          </a:p>
-          <a:p>
-            <a:r>
-              <a:rPr lang="en-US" dirty="0" smtClean="0"/>
-              <a:t>Static properties and methods</a:t>
-            </a:r>
-          </a:p>
-          <a:p>
-            <a:r>
-              <a:rPr lang="en-US" dirty="0" smtClean="0"/>
-              <a:t>Access control</a:t>
-            </a:r>
           </a:p>
         </p:txBody>
       </p:sp>
     </p:spTree>
     <p:extLst>
       <p:ext uri="{BB962C8B-B14F-4D97-AF65-F5344CB8AC3E}">
-        <p14:creationId xmlns:p14="http://schemas.microsoft.com/office/powerpoint/2010/main" val="1758032257"/>
+        <p14:creationId xmlns:p14="http://schemas.microsoft.com/office/powerpoint/2010/main" val="246996620"/>
       </p:ext>
     </p:extLst>
   </p:cSld>
   <p:clrMapOvr>
     <a:masterClrMapping/>
   </p:clrMapOvr>
-  <p:timing>
-    <p:tnLst>
-      <p:par>
-        <p:cTn id="1" dur="indefinite" restart="never" nodeType="tmRoot"/>
-      </p:par>
-    </p:tnLst>
-  </p:timing>
 </p:sld>
 </file>
 
@@ -4589,7 +4633,7 @@
           <a:p>
             <a:r>
               <a:rPr lang="en-US" dirty="0" smtClean="0"/>
-              <a:t>No more slides</a:t>
+              <a:t>About Improving</a:t>
             </a:r>
             <a:endParaRPr lang="en-US" dirty="0"/>
           </a:p>
@@ -4607,19 +4651,59 @@
         </p:nvSpPr>
         <p:spPr/>
         <p:txBody>
-          <a:bodyPr/>
+          <a:bodyPr>
+            <a:normAutofit fontScale="92500" lnSpcReduction="20000"/>
+          </a:bodyPr>
           <a:lstStyle/>
           <a:p>
-            <a:r>
-              <a:rPr lang="en-US" dirty="0" smtClean="0"/>
-              <a:t>Open Xcode</a:t>
-            </a:r>
-          </a:p>
-          <a:p>
-            <a:r>
-              <a:rPr lang="en-US" dirty="0" smtClean="0"/>
-              <a:t>Start a new playground to follow along and experiment</a:t>
-            </a:r>
+            <a:pPr marL="0" indent="0">
+              <a:buNone/>
+            </a:pPr>
+            <a:r>
+              <a:rPr lang="en-US" sz="4300" dirty="0"/>
+              <a:t>Creating a great place to work by</a:t>
+            </a:r>
+            <a:r>
+              <a:rPr lang="en-US" dirty="0"/>
+              <a:t> </a:t>
+            </a:r>
+          </a:p>
+          <a:p>
+            <a:pPr fontAlgn="auto"/>
+            <a:r>
+              <a:rPr lang="en-US" dirty="0"/>
+              <a:t>Cultivating an environment that fosters authentic and long term professional relationships </a:t>
+            </a:r>
+          </a:p>
+          <a:p>
+            <a:pPr fontAlgn="auto"/>
+            <a:r>
+              <a:rPr lang="en-US" dirty="0"/>
+              <a:t>Sharing the success and accomplishments of the company </a:t>
+            </a:r>
+          </a:p>
+          <a:p>
+            <a:pPr fontAlgn="auto"/>
+            <a:r>
+              <a:rPr lang="en-US" dirty="0"/>
+              <a:t>Promoting open and honest communication </a:t>
+            </a:r>
+          </a:p>
+          <a:p>
+            <a:pPr fontAlgn="auto"/>
+            <a:r>
+              <a:rPr lang="en-US" dirty="0"/>
+              <a:t>Providing creative ways for each of us to learn and grow </a:t>
+            </a:r>
+          </a:p>
+          <a:p>
+            <a:pPr fontAlgn="auto"/>
+            <a:r>
+              <a:rPr lang="en-US" dirty="0"/>
+              <a:t>Encouraging a positive atmosphere which is both friendly and fun </a:t>
+            </a:r>
+          </a:p>
+          <a:p>
             <a:endParaRPr lang="en-US" dirty="0"/>
           </a:p>
         </p:txBody>
@@ -4627,7 +4711,7 @@
     </p:spTree>
     <p:extLst>
       <p:ext uri="{BB962C8B-B14F-4D97-AF65-F5344CB8AC3E}">
-        <p14:creationId xmlns:p14="http://schemas.microsoft.com/office/powerpoint/2010/main" val="1974355100"/>
+        <p14:creationId xmlns:p14="http://schemas.microsoft.com/office/powerpoint/2010/main" val="2075318354"/>
       </p:ext>
     </p:extLst>
   </p:cSld>
@@ -4673,6 +4757,339 @@
           <a:p>
             <a:r>
               <a:rPr lang="en-US" dirty="0" smtClean="0"/>
+              <a:t>Agenda</a:t>
+            </a:r>
+            <a:endParaRPr lang="en-US" dirty="0"/>
+          </a:p>
+        </p:txBody>
+      </p:sp>
+      <p:sp>
+        <p:nvSpPr>
+          <p:cNvPr id="3" name="Content Placeholder 2"/>
+          <p:cNvSpPr>
+            <a:spLocks noGrp="1"/>
+          </p:cNvSpPr>
+          <p:nvPr>
+            <p:ph sz="half" idx="1"/>
+          </p:nvPr>
+        </p:nvSpPr>
+        <p:spPr/>
+        <p:txBody>
+          <a:bodyPr>
+            <a:normAutofit/>
+          </a:bodyPr>
+          <a:lstStyle/>
+          <a:p>
+            <a:r>
+              <a:rPr lang="en-US" dirty="0" smtClean="0"/>
+              <a:t>Variables and Constants</a:t>
+            </a:r>
+          </a:p>
+          <a:p>
+            <a:r>
+              <a:rPr lang="en-US" dirty="0" smtClean="0"/>
+              <a:t>Types</a:t>
+            </a:r>
+          </a:p>
+          <a:p>
+            <a:r>
+              <a:rPr lang="en-US" dirty="0" smtClean="0"/>
+              <a:t>Operators</a:t>
+            </a:r>
+          </a:p>
+          <a:p>
+            <a:r>
+              <a:rPr lang="en-US" dirty="0" smtClean="0"/>
+              <a:t>Arrays and Dictionaries</a:t>
+            </a:r>
+          </a:p>
+          <a:p>
+            <a:r>
+              <a:rPr lang="en-US" dirty="0" smtClean="0"/>
+              <a:t>Conditional statements</a:t>
+            </a:r>
+          </a:p>
+          <a:p>
+            <a:r>
+              <a:rPr lang="en-US" dirty="0" smtClean="0"/>
+              <a:t>Loops</a:t>
+            </a:r>
+          </a:p>
+          <a:p>
+            <a:r>
+              <a:rPr lang="en-US" dirty="0" smtClean="0"/>
+              <a:t>Switch case</a:t>
+            </a:r>
+          </a:p>
+        </p:txBody>
+      </p:sp>
+      <p:sp>
+        <p:nvSpPr>
+          <p:cNvPr id="4" name="Content Placeholder 3"/>
+          <p:cNvSpPr>
+            <a:spLocks noGrp="1"/>
+          </p:cNvSpPr>
+          <p:nvPr>
+            <p:ph sz="half" idx="2"/>
+          </p:nvPr>
+        </p:nvSpPr>
+        <p:spPr/>
+        <p:txBody>
+          <a:bodyPr>
+            <a:normAutofit/>
+          </a:bodyPr>
+          <a:lstStyle/>
+          <a:p>
+            <a:r>
+              <a:rPr lang="en-US" dirty="0"/>
+              <a:t>Functions and Closures</a:t>
+            </a:r>
+          </a:p>
+          <a:p>
+            <a:r>
+              <a:rPr lang="en-US" dirty="0" smtClean="0"/>
+              <a:t>Enumerations</a:t>
+            </a:r>
+          </a:p>
+          <a:p>
+            <a:r>
+              <a:rPr lang="en-US" dirty="0" err="1" smtClean="0"/>
+              <a:t>Structs</a:t>
+            </a:r>
+            <a:endParaRPr lang="en-US" dirty="0" smtClean="0"/>
+          </a:p>
+          <a:p>
+            <a:r>
+              <a:rPr lang="en-US" dirty="0" smtClean="0"/>
+              <a:t>Classes</a:t>
+            </a:r>
+          </a:p>
+          <a:p>
+            <a:r>
+              <a:rPr lang="en-US" dirty="0" smtClean="0"/>
+              <a:t>Properties</a:t>
+            </a:r>
+          </a:p>
+          <a:p>
+            <a:r>
+              <a:rPr lang="en-US" dirty="0" smtClean="0"/>
+              <a:t>Static properties and methods</a:t>
+            </a:r>
+          </a:p>
+        </p:txBody>
+      </p:sp>
+    </p:spTree>
+    <p:extLst>
+      <p:ext uri="{BB962C8B-B14F-4D97-AF65-F5344CB8AC3E}">
+        <p14:creationId xmlns:p14="http://schemas.microsoft.com/office/powerpoint/2010/main" val="1758032257"/>
+      </p:ext>
+    </p:extLst>
+  </p:cSld>
+  <p:clrMapOvr>
+    <a:masterClrMapping/>
+  </p:clrMapOvr>
+  <p:timing>
+    <p:tnLst>
+      <p:par>
+        <p:cTn id="1" dur="indefinite" restart="never" nodeType="tmRoot"/>
+      </p:par>
+    </p:tnLst>
+  </p:timing>
+</p:sld>
+</file>
+
+<file path=ppt/slides/slide6.xml><?xml version="1.0" encoding="utf-8"?>
+<p:sld xmlns:a="http://schemas.openxmlformats.org/drawingml/2006/main" xmlns:r="http://schemas.openxmlformats.org/officeDocument/2006/relationships" xmlns:p="http://schemas.openxmlformats.org/presentationml/2006/main">
+  <p:cSld>
+    <p:spTree>
+      <p:nvGrpSpPr>
+        <p:cNvPr id="1" name=""/>
+        <p:cNvGrpSpPr/>
+        <p:nvPr/>
+      </p:nvGrpSpPr>
+      <p:grpSpPr>
+        <a:xfrm>
+          <a:off x="0" y="0"/>
+          <a:ext cx="0" cy="0"/>
+          <a:chOff x="0" y="0"/>
+          <a:chExt cx="0" cy="0"/>
+        </a:xfrm>
+      </p:grpSpPr>
+      <p:sp>
+        <p:nvSpPr>
+          <p:cNvPr id="2" name="Title 1"/>
+          <p:cNvSpPr>
+            <a:spLocks noGrp="1"/>
+          </p:cNvSpPr>
+          <p:nvPr>
+            <p:ph type="title"/>
+          </p:nvPr>
+        </p:nvSpPr>
+        <p:spPr/>
+        <p:txBody>
+          <a:bodyPr>
+            <a:normAutofit fontScale="90000"/>
+          </a:bodyPr>
+          <a:lstStyle/>
+          <a:p>
+            <a:r>
+              <a:rPr lang="en-US" dirty="0" smtClean="0"/>
+              <a:t>Playground Time</a:t>
+            </a:r>
+            <a:endParaRPr lang="en-US" dirty="0"/>
+          </a:p>
+        </p:txBody>
+      </p:sp>
+      <p:sp>
+        <p:nvSpPr>
+          <p:cNvPr id="3" name="Content Placeholder 2"/>
+          <p:cNvSpPr>
+            <a:spLocks noGrp="1"/>
+          </p:cNvSpPr>
+          <p:nvPr>
+            <p:ph idx="1"/>
+          </p:nvPr>
+        </p:nvSpPr>
+        <p:spPr/>
+        <p:txBody>
+          <a:bodyPr/>
+          <a:lstStyle/>
+          <a:p>
+            <a:r>
+              <a:rPr lang="en-US" dirty="0" smtClean="0"/>
+              <a:t>Open Xcode</a:t>
+            </a:r>
+          </a:p>
+          <a:p>
+            <a:r>
+              <a:rPr lang="en-US" dirty="0" smtClean="0"/>
+              <a:t>Open playgrounds from GitHub repo</a:t>
+            </a:r>
+          </a:p>
+          <a:p>
+            <a:pPr lvl="1"/>
+            <a:r>
+              <a:rPr lang="en-US" dirty="0"/>
+              <a:t>Arrays and </a:t>
+            </a:r>
+            <a:r>
+              <a:rPr lang="en-US" dirty="0" smtClean="0"/>
+              <a:t>Dictionaries</a:t>
+            </a:r>
+          </a:p>
+          <a:p>
+            <a:pPr lvl="1"/>
+            <a:r>
+              <a:rPr lang="en-US" dirty="0" smtClean="0"/>
+              <a:t>Conditionals </a:t>
+            </a:r>
+            <a:r>
+              <a:rPr lang="en-US" dirty="0"/>
+              <a:t>Loops and </a:t>
+            </a:r>
+            <a:r>
+              <a:rPr lang="en-US" dirty="0" smtClean="0"/>
+              <a:t>Switches</a:t>
+            </a:r>
+          </a:p>
+          <a:p>
+            <a:pPr lvl="1"/>
+            <a:r>
+              <a:rPr lang="en-US" dirty="0" smtClean="0"/>
+              <a:t>Enumerations </a:t>
+            </a:r>
+            <a:r>
+              <a:rPr lang="en-US" dirty="0"/>
+              <a:t>Classes and </a:t>
+            </a:r>
+            <a:r>
+              <a:rPr lang="en-US" dirty="0" err="1" smtClean="0"/>
+              <a:t>Structs</a:t>
+            </a:r>
+            <a:endParaRPr lang="en-US" dirty="0" smtClean="0"/>
+          </a:p>
+          <a:p>
+            <a:pPr lvl="1"/>
+            <a:r>
+              <a:rPr lang="en-US" dirty="0" smtClean="0"/>
+              <a:t>Functions </a:t>
+            </a:r>
+            <a:r>
+              <a:rPr lang="en-US" dirty="0"/>
+              <a:t>and </a:t>
+            </a:r>
+            <a:r>
+              <a:rPr lang="en-US" dirty="0" smtClean="0"/>
+              <a:t>Closures</a:t>
+            </a:r>
+          </a:p>
+          <a:p>
+            <a:pPr lvl="1"/>
+            <a:r>
+              <a:rPr lang="en-US" dirty="0" smtClean="0"/>
+              <a:t>Variables Constants </a:t>
+            </a:r>
+            <a:r>
+              <a:rPr lang="en-US" dirty="0"/>
+              <a:t>Types and </a:t>
+            </a:r>
+            <a:r>
+              <a:rPr lang="en-US" dirty="0" smtClean="0"/>
+              <a:t>Operators</a:t>
+            </a:r>
+            <a:endParaRPr lang="en-US" dirty="0"/>
+          </a:p>
+        </p:txBody>
+      </p:sp>
+    </p:spTree>
+    <p:extLst>
+      <p:ext uri="{BB962C8B-B14F-4D97-AF65-F5344CB8AC3E}">
+        <p14:creationId xmlns:p14="http://schemas.microsoft.com/office/powerpoint/2010/main" val="1974355100"/>
+      </p:ext>
+    </p:extLst>
+  </p:cSld>
+  <p:clrMapOvr>
+    <a:masterClrMapping/>
+  </p:clrMapOvr>
+</p:sld>
+</file>
+
+<file path=ppt/slides/slide7.xml><?xml version="1.0" encoding="utf-8"?>
+<p:sld xmlns:a="http://schemas.openxmlformats.org/drawingml/2006/main" xmlns:r="http://schemas.openxmlformats.org/officeDocument/2006/relationships" xmlns:p="http://schemas.openxmlformats.org/presentationml/2006/main">
+  <p:cSld>
+    <p:spTree>
+      <p:nvGrpSpPr>
+        <p:cNvPr id="1" name=""/>
+        <p:cNvGrpSpPr/>
+        <p:nvPr/>
+      </p:nvGrpSpPr>
+      <p:grpSpPr>
+        <a:xfrm>
+          <a:off x="0" y="0"/>
+          <a:ext cx="0" cy="0"/>
+          <a:chOff x="0" y="0"/>
+          <a:chExt cx="0" cy="0"/>
+        </a:xfrm>
+      </p:grpSpPr>
+      <p:sp>
+        <p:nvSpPr>
+          <p:cNvPr id="2" name="Title 1"/>
+          <p:cNvSpPr>
+            <a:spLocks noGrp="1"/>
+          </p:cNvSpPr>
+          <p:nvPr>
+            <p:ph type="title"/>
+          </p:nvPr>
+        </p:nvSpPr>
+        <p:spPr/>
+        <p:txBody>
+          <a:bodyPr>
+            <a:normAutofit fontScale="90000"/>
+          </a:bodyPr>
+          <a:lstStyle/>
+          <a:p>
+            <a:r>
+              <a:rPr lang="en-US" dirty="0" smtClean="0"/>
               <a:t>Additional Info</a:t>
             </a:r>
             <a:endParaRPr lang="en-US" dirty="0"/>
@@ -4692,7 +5109,7 @@
         <p:spPr/>
         <p:txBody>
           <a:bodyPr>
-            <a:normAutofit fontScale="77500" lnSpcReduction="20000"/>
+            <a:normAutofit fontScale="62500" lnSpcReduction="20000"/>
           </a:bodyPr>
           <a:lstStyle/>
           <a:p>
@@ -4839,60 +5256,81 @@
           <a:p>
             <a:pPr lvl="1"/>
             <a:r>
-              <a:rPr lang="en-US" dirty="0" smtClean="0"/>
-              <a:t>Hacking </a:t>
-            </a:r>
-            <a:r>
               <a:rPr lang="en-US" dirty="0"/>
-              <a:t>with Swift</a:t>
+              <a:t>Swift Presentations, Documentation, and Sample Code</a:t>
             </a:r>
             <a:br>
               <a:rPr lang="en-US" dirty="0"/>
             </a:br>
             <a:r>
+              <a:rPr lang="en-US" dirty="0">
+                <a:hlinkClick r:id="rId6"/>
+              </a:rPr>
+              <a:t>https://developer.apple.com/swift/resources</a:t>
+            </a:r>
+            <a:r>
               <a:rPr lang="en-US" dirty="0" smtClean="0">
                 <a:hlinkClick r:id="rId6"/>
               </a:rPr>
-              <a:t>https</a:t>
-            </a:r>
-            <a:r>
-              <a:rPr lang="en-US" dirty="0">
-                <a:hlinkClick r:id="rId6"/>
-              </a:rPr>
-              <a:t>://</a:t>
-            </a:r>
-            <a:r>
-              <a:rPr lang="en-US" dirty="0" smtClean="0">
-                <a:hlinkClick r:id="rId6"/>
-              </a:rPr>
-              <a:t>goo.gl/Qqscwu</a:t>
-            </a:r>
-            <a:endParaRPr lang="en-US" dirty="0"/>
+              <a:t>/</a:t>
+            </a:r>
+            <a:endParaRPr lang="en-US" dirty="0" smtClean="0"/>
           </a:p>
           <a:p>
             <a:pPr lvl="1"/>
             <a:r>
+              <a:rPr lang="en-US" dirty="0" smtClean="0"/>
+              <a:t>Hacking </a:t>
+            </a:r>
+            <a:r>
               <a:rPr lang="en-US" dirty="0"/>
-              <a:t>Swift Weekly Newsletter</a:t>
+              <a:t>with Swift</a:t>
             </a:r>
             <a:br>
               <a:rPr lang="en-US" dirty="0"/>
             </a:br>
             <a:r>
+              <a:rPr lang="en-US" dirty="0">
+                <a:hlinkClick r:id="rId7"/>
+              </a:rPr>
+              <a:t>https://</a:t>
+            </a:r>
+            <a:r>
               <a:rPr lang="en-US" dirty="0" smtClean="0">
                 <a:hlinkClick r:id="rId7"/>
               </a:rPr>
+              <a:t>www.hackingwithswift.com</a:t>
+            </a:r>
+            <a:endParaRPr lang="en-US" dirty="0" smtClean="0"/>
+          </a:p>
+          <a:p>
+            <a:pPr lvl="1"/>
+            <a:r>
+              <a:rPr lang="en-US" dirty="0" smtClean="0"/>
+              <a:t>Swift </a:t>
+            </a:r>
+            <a:r>
+              <a:rPr lang="en-US" dirty="0"/>
+              <a:t>Weekly Newsletter</a:t>
+            </a:r>
+            <a:br>
+              <a:rPr lang="en-US" dirty="0"/>
+            </a:br>
+            <a:r>
+              <a:rPr lang="en-US" dirty="0" smtClean="0">
+                <a:hlinkClick r:id="rId8"/>
+              </a:rPr>
               <a:t>http</a:t>
             </a:r>
             <a:r>
               <a:rPr lang="en-US" dirty="0">
-                <a:hlinkClick r:id="rId7"/>
+                <a:hlinkClick r:id="rId8"/>
               </a:rPr>
               <a:t>://</a:t>
             </a:r>
             <a:r>
               <a:rPr lang="en-US" dirty="0" smtClean="0">
-                <a:hlinkClick r:id="rId7"/>
+                <a:hlinkClick r:id="rId8"/>
               </a:rPr>
               <a:t>www.swiftweekly.com</a:t>
             </a:r>
@@ -4927,7 +5365,7 @@
 </p:sld>
 </file>
 
-<file path=ppt/slides/slide6.xml><?xml version="1.0" encoding="utf-8"?>
+<file path=ppt/slides/slide8.xml><?xml version="1.0" encoding="utf-8"?>
 <p:sld xmlns:a="http://schemas.openxmlformats.org/drawingml/2006/main" xmlns:r="http://schemas.openxmlformats.org/officeDocument/2006/relationships" xmlns:p="http://schemas.openxmlformats.org/presentationml/2006/main">
   <p:cSld>
     <p:spTree>

</xml_diff>

<commit_message>
Updates for Columbus Code Camp 2016
</commit_message>
<xml_diff>
--- a/A Swift Introduction to Swift.pptx
+++ b/A Swift Introduction to Swift.pptx
@@ -215,7 +215,7 @@
           <a:p>
             <a:fld id="{DE4C9721-1813-4A55-A5DA-76417DB5EE62}" type="datetimeFigureOut">
               <a:rPr lang="en-US" smtClean="0"/>
-              <a:t>8/5/16</a:t>
+              <a:t>10/20/16</a:t>
             </a:fld>
             <a:endParaRPr lang="en-US"/>
           </a:p>
@@ -562,7 +562,7 @@
               <a:rPr lang="en-US" smtClean="0"/>
               <a:t>2</a:t>
             </a:fld>
-            <a:endParaRPr lang="en-US"/>
+            <a:endParaRPr lang="en-US" dirty="0"/>
           </a:p>
         </p:txBody>
       </p:sp>
@@ -797,7 +797,7 @@
           <a:p>
             <a:fld id="{1A6A9824-C09F-4166-9A2C-6C9FA577887A}" type="datetimeFigureOut">
               <a:rPr lang="en-US" smtClean="0"/>
-              <a:t>8/5/16</a:t>
+              <a:t>10/20/16</a:t>
             </a:fld>
             <a:endParaRPr lang="en-US"/>
           </a:p>
@@ -1007,7 +1007,7 @@
           <a:p>
             <a:fld id="{2A7CB402-B72D-3346-9EA5-354251120F9E}" type="datetimeFigureOut">
               <a:rPr lang="en-US" smtClean="0"/>
-              <a:t>8/5/16</a:t>
+              <a:t>10/20/16</a:t>
             </a:fld>
             <a:endParaRPr lang="en-US"/>
           </a:p>
@@ -1168,7 +1168,7 @@
           <a:p>
             <a:fld id="{2A7CB402-B72D-3346-9EA5-354251120F9E}" type="datetimeFigureOut">
               <a:rPr lang="en-US" smtClean="0"/>
-              <a:t>8/5/16</a:t>
+              <a:t>10/20/16</a:t>
             </a:fld>
             <a:endParaRPr lang="en-US"/>
           </a:p>
@@ -1391,7 +1391,7 @@
           <a:p>
             <a:fld id="{2A7CB402-B72D-3346-9EA5-354251120F9E}" type="datetimeFigureOut">
               <a:rPr lang="en-US" smtClean="0"/>
-              <a:t>8/5/16</a:t>
+              <a:t>10/20/16</a:t>
             </a:fld>
             <a:endParaRPr lang="en-US"/>
           </a:p>
@@ -1730,7 +1730,7 @@
           <a:p>
             <a:fld id="{2A7CB402-B72D-3346-9EA5-354251120F9E}" type="datetimeFigureOut">
               <a:rPr lang="en-US" smtClean="0"/>
-              <a:t>8/5/16</a:t>
+              <a:t>10/20/16</a:t>
             </a:fld>
             <a:endParaRPr lang="en-US"/>
           </a:p>
@@ -2108,7 +2108,7 @@
           <a:p>
             <a:fld id="{2A7CB402-B72D-3346-9EA5-354251120F9E}" type="datetimeFigureOut">
               <a:rPr lang="en-US" smtClean="0"/>
-              <a:t>8/5/16</a:t>
+              <a:t>10/20/16</a:t>
             </a:fld>
             <a:endParaRPr lang="en-US"/>
           </a:p>
@@ -2624,7 +2624,7 @@
           <a:p>
             <a:fld id="{2A7CB402-B72D-3346-9EA5-354251120F9E}" type="datetimeFigureOut">
               <a:rPr lang="en-US" smtClean="0"/>
-              <a:t>8/5/16</a:t>
+              <a:t>10/20/16</a:t>
             </a:fld>
             <a:endParaRPr lang="en-US"/>
           </a:p>
@@ -2792,7 +2792,7 @@
           <a:p>
             <a:fld id="{2A7CB402-B72D-3346-9EA5-354251120F9E}" type="datetimeFigureOut">
               <a:rPr lang="en-US" smtClean="0"/>
-              <a:t>8/5/16</a:t>
+              <a:t>10/20/16</a:t>
             </a:fld>
             <a:endParaRPr lang="en-US"/>
           </a:p>
@@ -2922,7 +2922,7 @@
           <a:p>
             <a:fld id="{2A7CB402-B72D-3346-9EA5-354251120F9E}" type="datetimeFigureOut">
               <a:rPr lang="en-US" smtClean="0"/>
-              <a:t>8/5/16</a:t>
+              <a:t>10/20/16</a:t>
             </a:fld>
             <a:endParaRPr lang="en-US"/>
           </a:p>
@@ -3270,7 +3270,7 @@
           <a:p>
             <a:fld id="{2A7CB402-B72D-3346-9EA5-354251120F9E}" type="datetimeFigureOut">
               <a:rPr lang="en-US" smtClean="0"/>
-              <a:t>8/5/16</a:t>
+              <a:t>10/20/16</a:t>
             </a:fld>
             <a:endParaRPr lang="en-US"/>
           </a:p>
@@ -3584,7 +3584,7 @@
           <a:p>
             <a:fld id="{2A7CB402-B72D-3346-9EA5-354251120F9E}" type="datetimeFigureOut">
               <a:rPr lang="en-US" smtClean="0"/>
-              <a:t>8/5/16</a:t>
+              <a:t>10/20/16</a:t>
             </a:fld>
             <a:endParaRPr lang="en-US"/>
           </a:p>
@@ -3808,7 +3808,7 @@
           <a:p>
             <a:fld id="{2A7CB402-B72D-3346-9EA5-354251120F9E}" type="datetimeFigureOut">
               <a:rPr lang="en-US" smtClean="0"/>
-              <a:t>8/5/16</a:t>
+              <a:t>10/20/16</a:t>
             </a:fld>
             <a:endParaRPr lang="en-US"/>
           </a:p>
@@ -4213,7 +4213,9 @@
         </p:nvSpPr>
         <p:spPr/>
         <p:txBody>
-          <a:bodyPr/>
+          <a:bodyPr>
+            <a:normAutofit lnSpcReduction="10000"/>
+          </a:bodyPr>
           <a:lstStyle/>
           <a:p>
             <a:r>
@@ -4261,15 +4263,23 @@
               <a:t>Enumerations Classes and </a:t>
             </a:r>
             <a:r>
-              <a:rPr lang="en-US" dirty="0" err="1"/>
+              <a:rPr lang="en-US" dirty="0" err="1" smtClean="0"/>
               <a:t>Structs</a:t>
             </a:r>
-            <a:endParaRPr lang="en-US" dirty="0"/>
+            <a:endParaRPr lang="en-US" smtClean="0"/>
           </a:p>
           <a:p>
             <a:pPr lvl="1"/>
             <a:r>
-              <a:rPr lang="en-US" dirty="0"/>
+              <a:rPr lang="en-US" smtClean="0"/>
+              <a:t>Error Handling</a:t>
+            </a:r>
+            <a:endParaRPr lang="en-US"/>
+          </a:p>
+          <a:p>
+            <a:pPr lvl="1"/>
+            <a:r>
+              <a:rPr lang="en-US"/>
               <a:t>Functions and Closures</a:t>
             </a:r>
           </a:p>
@@ -4284,21 +4294,22 @@
               <a:t>Constants </a:t>
             </a:r>
             <a:r>
-              <a:rPr lang="en-US" dirty="0"/>
+              <a:rPr lang="en-US"/>
               <a:t>Types and Operators</a:t>
             </a:r>
           </a:p>
           <a:p>
             <a:r>
-              <a:rPr lang="en-US" dirty="0" smtClean="0"/>
-              <a:t>Xcode</a:t>
-            </a:r>
+              <a:rPr lang="en-US" smtClean="0"/>
+              <a:t>Xcode 8</a:t>
+            </a:r>
+            <a:endParaRPr lang="en-US" smtClean="0"/>
           </a:p>
           <a:p>
             <a:pPr marL="0" indent="0">
               <a:buNone/>
             </a:pPr>
-            <a:endParaRPr lang="en-US" dirty="0"/>
+            <a:endParaRPr lang="en-US"/>
           </a:p>
         </p:txBody>
       </p:sp>
@@ -4350,22 +4361,22 @@
           <a:lstStyle/>
           <a:p>
             <a:r>
-              <a:rPr lang="en-US" dirty="0"/>
+              <a:rPr lang="en-US"/>
               <a:t>A S</a:t>
             </a:r>
             <a:r>
-              <a:rPr lang="en-US" dirty="0" smtClean="0"/>
+              <a:rPr lang="en-US" smtClean="0"/>
               <a:t>wift Introduction </a:t>
             </a:r>
             <a:r>
-              <a:rPr lang="en-US" dirty="0"/>
+              <a:rPr lang="en-US"/>
               <a:t>to </a:t>
             </a:r>
             <a:r>
-              <a:rPr lang="en-US" dirty="0" smtClean="0"/>
+              <a:rPr lang="en-US" smtClean="0"/>
               <a:t>Swift (pun intended)</a:t>
             </a:r>
-            <a:endParaRPr lang="en-US" dirty="0"/>
+            <a:endParaRPr lang="en-US"/>
           </a:p>
         </p:txBody>
       </p:sp>
@@ -4386,13 +4397,8 @@
           <a:p>
             <a:r>
               <a:rPr lang="en-US" dirty="0" smtClean="0"/>
-              <a:t>Keith </a:t>
-            </a:r>
-            <a:r>
-              <a:rPr lang="en-US" dirty="0" err="1" smtClean="0"/>
-              <a:t>Wedinger</a:t>
-            </a:r>
-            <a:endParaRPr lang="en-US" dirty="0" smtClean="0"/>
+              <a:t>Keith Wedinger</a:t>
+            </a:r>
           </a:p>
           <a:p>
             <a:r>
@@ -4486,101 +4492,125 @@
         <p:spPr/>
         <p:txBody>
           <a:bodyPr>
-            <a:normAutofit fontScale="77500" lnSpcReduction="20000"/>
+            <a:noAutofit/>
           </a:bodyPr>
           <a:lstStyle/>
           <a:p>
             <a:r>
-              <a:rPr lang="en-US" dirty="0" smtClean="0"/>
+              <a:rPr lang="en-US" sz="2200" dirty="0" smtClean="0"/>
               <a:t>Over </a:t>
             </a:r>
             <a:r>
-              <a:rPr lang="en-US" dirty="0"/>
-              <a:t>26 years experience architecting, designing, developing and delivering high quality software solutions for several companies including Diebold, IBM, Lexmark, Limited Brands, Ohio State, and Sterling </a:t>
-            </a:r>
-            <a:r>
-              <a:rPr lang="en-US" dirty="0" smtClean="0"/>
+              <a:rPr lang="en-US" sz="2200" dirty="0" smtClean="0"/>
+              <a:t>27 </a:t>
+            </a:r>
+            <a:r>
+              <a:rPr lang="en-US" sz="2200" dirty="0"/>
+              <a:t>years experience architecting, designing, developing and delivering high quality software solutions for several companies including </a:t>
+            </a:r>
+            <a:r>
+              <a:rPr lang="en-US" sz="2200" dirty="0" smtClean="0"/>
+              <a:t>Abercrombie &amp; Fitch, Diebold</a:t>
+            </a:r>
+            <a:r>
+              <a:rPr lang="en-US" sz="2200" dirty="0"/>
+              <a:t>, IBM, Lexmark, Limited Brands, Ohio State, and Sterling </a:t>
+            </a:r>
+            <a:r>
+              <a:rPr lang="en-US" sz="2200" dirty="0" smtClean="0"/>
               <a:t>Commerce.</a:t>
             </a:r>
           </a:p>
           <a:p>
             <a:r>
-              <a:rPr lang="en-US" dirty="0" smtClean="0"/>
+              <a:rPr lang="en-US" sz="2200" dirty="0" smtClean="0"/>
               <a:t>Very </a:t>
             </a:r>
             <a:r>
-              <a:rPr lang="en-US" dirty="0"/>
+              <a:rPr lang="en-US" sz="2200" dirty="0"/>
               <a:t>passionate about architecting and developing software solutions that deliver exceptional ROI to </a:t>
             </a:r>
             <a:r>
-              <a:rPr lang="en-US" dirty="0" smtClean="0"/>
+              <a:rPr lang="en-US" sz="2200" dirty="0" smtClean="0"/>
               <a:t>my clients.</a:t>
             </a:r>
           </a:p>
           <a:p>
             <a:r>
-              <a:rPr lang="en-US" dirty="0" smtClean="0"/>
+              <a:rPr lang="en-US" sz="2200" dirty="0" smtClean="0"/>
               <a:t>Presented </a:t>
             </a:r>
             <a:r>
-              <a:rPr lang="en-US" dirty="0"/>
+              <a:rPr lang="en-US" sz="2200" dirty="0"/>
               <a:t>at CodeMash, Code </a:t>
             </a:r>
             <a:r>
-              <a:rPr lang="en-US" dirty="0" err="1"/>
+              <a:rPr lang="en-US" sz="2200" dirty="0" err="1"/>
               <a:t>PaLOUsa</a:t>
             </a:r>
             <a:r>
-              <a:rPr lang="en-US" dirty="0"/>
-              <a:t>, Columbus Code Camp, M3, Path to Agility, StirTrek, and That Conference</a:t>
-            </a:r>
-            <a:r>
-              <a:rPr lang="en-US" dirty="0" smtClean="0"/>
+              <a:rPr lang="en-US" sz="2200" dirty="0"/>
+              <a:t>, Columbus Code Camp, </a:t>
+            </a:r>
+            <a:r>
+              <a:rPr lang="en-US" sz="2200" dirty="0" err="1" smtClean="0"/>
+              <a:t>DogFoodCon</a:t>
+            </a:r>
+            <a:r>
+              <a:rPr lang="en-US" sz="2200" dirty="0" smtClean="0"/>
+              <a:t>, M3</a:t>
+            </a:r>
+            <a:r>
+              <a:rPr lang="en-US" sz="2200" dirty="0"/>
+              <a:t>, Path to Agility, StirTrek, and That Conference</a:t>
+            </a:r>
+            <a:r>
+              <a:rPr lang="en-US" sz="2200" dirty="0" smtClean="0"/>
               <a:t>.</a:t>
             </a:r>
           </a:p>
           <a:p>
             <a:r>
-              <a:rPr lang="en-US" dirty="0" smtClean="0"/>
+              <a:rPr lang="en-US" sz="2200" dirty="0" smtClean="0"/>
               <a:t>When </a:t>
             </a:r>
             <a:r>
-              <a:rPr lang="en-US" dirty="0"/>
+              <a:rPr lang="en-US" sz="2200" dirty="0"/>
               <a:t>not at work, e</a:t>
             </a:r>
             <a:r>
-              <a:rPr lang="en-US" dirty="0" smtClean="0"/>
+              <a:rPr lang="en-US" sz="2200" dirty="0" smtClean="0"/>
               <a:t>njoys </a:t>
             </a:r>
             <a:r>
-              <a:rPr lang="en-US" dirty="0"/>
+              <a:rPr lang="en-US" sz="2200" dirty="0"/>
               <a:t>dining and traveling with </a:t>
             </a:r>
             <a:r>
-              <a:rPr lang="en-US" dirty="0" smtClean="0"/>
+              <a:rPr lang="en-US" sz="2200" dirty="0" smtClean="0"/>
               <a:t>my beautiful </a:t>
             </a:r>
             <a:r>
-              <a:rPr lang="en-US" dirty="0"/>
+              <a:rPr lang="en-US" sz="2200" dirty="0"/>
               <a:t>wife Karen, craft beer and spending time when </a:t>
             </a:r>
             <a:r>
-              <a:rPr lang="en-US" dirty="0" smtClean="0"/>
+              <a:rPr lang="en-US" sz="2200" dirty="0" smtClean="0"/>
               <a:t>I can </a:t>
             </a:r>
             <a:r>
-              <a:rPr lang="en-US" dirty="0"/>
+              <a:rPr lang="en-US" sz="2200" dirty="0"/>
               <a:t>with </a:t>
             </a:r>
             <a:r>
-              <a:rPr lang="en-US" dirty="0" smtClean="0"/>
+              <a:rPr lang="en-US" sz="2200" dirty="0" smtClean="0"/>
               <a:t>my two </a:t>
             </a:r>
             <a:r>
-              <a:rPr lang="en-US" dirty="0"/>
+              <a:rPr lang="en-US" sz="2200" dirty="0"/>
               <a:t>daughters who are currently away at college.</a:t>
             </a:r>
-            <a:endParaRPr lang="en-US" dirty="0" smtClean="0"/>
+            <a:endParaRPr lang="en-US" sz="2200" dirty="0" smtClean="0"/>
           </a:p>
         </p:txBody>
       </p:sp>
@@ -4632,10 +4662,10 @@
           <a:lstStyle/>
           <a:p>
             <a:r>
-              <a:rPr lang="en-US" dirty="0" smtClean="0"/>
+              <a:rPr lang="en-US" smtClean="0"/>
               <a:t>About Improving</a:t>
             </a:r>
-            <a:endParaRPr lang="en-US" dirty="0"/>
+            <a:endParaRPr lang="en-US"/>
           </a:p>
         </p:txBody>
       </p:sp>
@@ -4660,51 +4690,51 @@
               <a:buNone/>
             </a:pPr>
             <a:r>
-              <a:rPr lang="en-US" sz="4300" dirty="0"/>
+              <a:rPr lang="en-US" sz="4300"/>
               <a:t>Creating a great place to work by</a:t>
             </a:r>
             <a:r>
-              <a:rPr lang="en-US" dirty="0"/>
+              <a:rPr lang="en-US"/>
               <a:t> </a:t>
             </a:r>
           </a:p>
           <a:p>
             <a:pPr fontAlgn="auto"/>
             <a:r>
-              <a:rPr lang="en-US" dirty="0"/>
+              <a:rPr lang="en-US"/>
               <a:t>Cultivating an environment that fosters authentic and long term professional relationships </a:t>
             </a:r>
           </a:p>
           <a:p>
             <a:pPr fontAlgn="auto"/>
             <a:r>
-              <a:rPr lang="en-US" dirty="0"/>
+              <a:rPr lang="en-US"/>
               <a:t>Sharing the success and accomplishments of the company </a:t>
             </a:r>
           </a:p>
           <a:p>
             <a:pPr fontAlgn="auto"/>
             <a:r>
-              <a:rPr lang="en-US" dirty="0"/>
+              <a:rPr lang="en-US"/>
               <a:t>Promoting open and honest communication </a:t>
             </a:r>
           </a:p>
           <a:p>
             <a:pPr fontAlgn="auto"/>
             <a:r>
-              <a:rPr lang="en-US" dirty="0"/>
+              <a:rPr lang="en-US"/>
               <a:t>Providing creative ways for each of us to learn and grow </a:t>
             </a:r>
           </a:p>
           <a:p>
             <a:pPr fontAlgn="auto"/>
             <a:r>
-              <a:rPr lang="en-US" dirty="0"/>
+              <a:rPr lang="en-US"/>
               <a:t>Encouraging a positive atmosphere which is both friendly and fun </a:t>
             </a:r>
           </a:p>
           <a:p>
-            <a:endParaRPr lang="en-US" dirty="0"/>
+            <a:endParaRPr lang="en-US"/>
           </a:p>
         </p:txBody>
       </p:sp>
@@ -4756,10 +4786,10 @@
           <a:lstStyle/>
           <a:p>
             <a:r>
-              <a:rPr lang="en-US" dirty="0" smtClean="0"/>
+              <a:rPr lang="en-US" smtClean="0"/>
               <a:t>Agenda</a:t>
             </a:r>
-            <a:endParaRPr lang="en-US" dirty="0"/>
+            <a:endParaRPr lang="en-US"/>
           </a:p>
         </p:txBody>
       </p:sp>
@@ -4781,43 +4811,43 @@
           <a:lstStyle/>
           <a:p>
             <a:r>
-              <a:rPr lang="en-US" dirty="0" smtClean="0"/>
+              <a:rPr lang="en-US" smtClean="0"/>
               <a:t>Variables and Constants</a:t>
             </a:r>
           </a:p>
           <a:p>
             <a:r>
-              <a:rPr lang="en-US" dirty="0" smtClean="0"/>
+              <a:rPr lang="en-US" smtClean="0"/>
               <a:t>Types</a:t>
             </a:r>
           </a:p>
           <a:p>
             <a:r>
-              <a:rPr lang="en-US" dirty="0" smtClean="0"/>
+              <a:rPr lang="en-US" smtClean="0"/>
               <a:t>Operators</a:t>
             </a:r>
           </a:p>
           <a:p>
             <a:r>
-              <a:rPr lang="en-US" dirty="0" smtClean="0"/>
+              <a:rPr lang="en-US" smtClean="0"/>
               <a:t>Arrays and Dictionaries</a:t>
             </a:r>
           </a:p>
           <a:p>
             <a:r>
-              <a:rPr lang="en-US" dirty="0" smtClean="0"/>
+              <a:rPr lang="en-US" smtClean="0"/>
               <a:t>Conditional statements</a:t>
             </a:r>
           </a:p>
           <a:p>
             <a:r>
-              <a:rPr lang="en-US" dirty="0" smtClean="0"/>
+              <a:rPr lang="en-US" smtClean="0"/>
               <a:t>Loops</a:t>
             </a:r>
           </a:p>
           <a:p>
             <a:r>
-              <a:rPr lang="en-US" dirty="0" smtClean="0"/>
+              <a:rPr lang="en-US" smtClean="0"/>
               <a:t>Switch case</a:t>
             </a:r>
           </a:p>
@@ -4841,40 +4871,51 @@
           <a:lstStyle/>
           <a:p>
             <a:r>
-              <a:rPr lang="en-US" dirty="0"/>
+              <a:rPr lang="en-US"/>
               <a:t>Functions and Closures</a:t>
             </a:r>
           </a:p>
           <a:p>
             <a:r>
-              <a:rPr lang="en-US" dirty="0" smtClean="0"/>
+              <a:rPr lang="en-US" smtClean="0"/>
               <a:t>Enumerations</a:t>
             </a:r>
           </a:p>
           <a:p>
             <a:r>
-              <a:rPr lang="en-US" dirty="0" err="1" smtClean="0"/>
+              <a:rPr lang="en-US" err="1" smtClean="0"/>
               <a:t>Structs</a:t>
             </a:r>
-            <a:endParaRPr lang="en-US" dirty="0" smtClean="0"/>
-          </a:p>
-          <a:p>
-            <a:r>
-              <a:rPr lang="en-US" dirty="0" smtClean="0"/>
+            <a:endParaRPr lang="en-US" smtClean="0"/>
+          </a:p>
+          <a:p>
+            <a:r>
+              <a:rPr lang="en-US" smtClean="0"/>
               <a:t>Classes</a:t>
             </a:r>
           </a:p>
           <a:p>
             <a:r>
-              <a:rPr lang="en-US" dirty="0" smtClean="0"/>
+              <a:rPr lang="en-US" smtClean="0"/>
               <a:t>Properties</a:t>
             </a:r>
           </a:p>
           <a:p>
             <a:r>
-              <a:rPr lang="en-US" dirty="0" smtClean="0"/>
-              <a:t>Static properties and methods</a:t>
-            </a:r>
+              <a:rPr lang="en-US" smtClean="0"/>
+              <a:t>Static properties and </a:t>
+            </a:r>
+            <a:r>
+              <a:rPr lang="en-US" smtClean="0"/>
+              <a:t>methods</a:t>
+            </a:r>
+          </a:p>
+          <a:p>
+            <a:r>
+              <a:rPr lang="en-US" smtClean="0"/>
+              <a:t>Error Handling</a:t>
+            </a:r>
+            <a:endParaRPr lang="en-US" smtClean="0"/>
           </a:p>
         </p:txBody>
       </p:sp>
@@ -4933,10 +4974,10 @@
           <a:lstStyle/>
           <a:p>
             <a:r>
-              <a:rPr lang="en-US" dirty="0" smtClean="0"/>
+              <a:rPr lang="en-US" smtClean="0"/>
               <a:t>Playground Time</a:t>
             </a:r>
-            <a:endParaRPr lang="en-US" dirty="0"/>
+            <a:endParaRPr lang="en-US"/>
           </a:p>
         </p:txBody>
       </p:sp>
@@ -4956,88 +4997,96 @@
           <a:lstStyle/>
           <a:p>
             <a:r>
-              <a:rPr lang="en-US" dirty="0" smtClean="0"/>
+              <a:rPr lang="en-US" smtClean="0"/>
               <a:t>Open Xcode</a:t>
             </a:r>
           </a:p>
           <a:p>
             <a:r>
-              <a:rPr lang="en-US" dirty="0" smtClean="0"/>
+              <a:rPr lang="en-US" smtClean="0"/>
               <a:t>Open playgrounds from GitHub repo</a:t>
             </a:r>
           </a:p>
           <a:p>
             <a:pPr lvl="1"/>
             <a:r>
-              <a:rPr lang="en-US" dirty="0"/>
+              <a:rPr lang="en-US"/>
               <a:t>Arrays and </a:t>
             </a:r>
             <a:r>
-              <a:rPr lang="en-US" dirty="0" smtClean="0"/>
+              <a:rPr lang="en-US" smtClean="0"/>
               <a:t>Dictionaries</a:t>
             </a:r>
           </a:p>
           <a:p>
             <a:pPr lvl="1"/>
             <a:r>
-              <a:rPr lang="en-US" dirty="0" smtClean="0"/>
+              <a:rPr lang="en-US" smtClean="0"/>
               <a:t>Conditionals </a:t>
             </a:r>
             <a:r>
-              <a:rPr lang="en-US" dirty="0"/>
+              <a:rPr lang="en-US"/>
               <a:t>Loops and </a:t>
             </a:r>
             <a:r>
-              <a:rPr lang="en-US" dirty="0" smtClean="0"/>
+              <a:rPr lang="en-US" smtClean="0"/>
               <a:t>Switches</a:t>
             </a:r>
           </a:p>
           <a:p>
             <a:pPr lvl="1"/>
             <a:r>
-              <a:rPr lang="en-US" dirty="0" smtClean="0"/>
+              <a:rPr lang="en-US" smtClean="0"/>
               <a:t>Enumerations </a:t>
             </a:r>
             <a:r>
-              <a:rPr lang="en-US" dirty="0"/>
+              <a:rPr lang="en-US"/>
               <a:t>Classes and </a:t>
             </a:r>
             <a:r>
-              <a:rPr lang="en-US" dirty="0" err="1" smtClean="0"/>
+              <a:rPr lang="en-US" err="1" smtClean="0"/>
               <a:t>Structs</a:t>
             </a:r>
-            <a:endParaRPr lang="en-US" dirty="0" smtClean="0"/>
+            <a:endParaRPr lang="en-US" smtClean="0"/>
           </a:p>
           <a:p>
             <a:pPr lvl="1"/>
             <a:r>
-              <a:rPr lang="en-US" dirty="0" smtClean="0"/>
+              <a:rPr lang="en-US" smtClean="0"/>
+              <a:t>Error Handling</a:t>
+            </a:r>
+            <a:endParaRPr lang="en-US" smtClean="0"/>
+          </a:p>
+          <a:p>
+            <a:pPr lvl="1"/>
+            <a:r>
+              <a:rPr lang="en-US" smtClean="0"/>
               <a:t>Functions </a:t>
             </a:r>
             <a:r>
-              <a:rPr lang="en-US" dirty="0"/>
+              <a:rPr lang="en-US"/>
               <a:t>and </a:t>
             </a:r>
             <a:r>
-              <a:rPr lang="en-US" dirty="0" smtClean="0"/>
+              <a:rPr lang="en-US" smtClean="0"/>
               <a:t>Closures</a:t>
             </a:r>
           </a:p>
           <a:p>
             <a:pPr lvl="1"/>
             <a:r>
-              <a:rPr lang="en-US" dirty="0" smtClean="0"/>
+              <a:rPr lang="en-US" smtClean="0"/>
               <a:t>Variables Constants </a:t>
             </a:r>
             <a:r>
-              <a:rPr lang="en-US" dirty="0"/>
+              <a:rPr lang="en-US"/>
               <a:t>Types and </a:t>
             </a:r>
             <a:r>
-              <a:rPr lang="en-US" dirty="0" smtClean="0"/>
+              <a:rPr lang="en-US" smtClean="0"/>
               <a:t>Operators</a:t>
             </a:r>
-            <a:endParaRPr lang="en-US" dirty="0"/>
+            <a:endParaRPr lang="en-US"/>
           </a:p>
         </p:txBody>
       </p:sp>
@@ -5089,10 +5138,10 @@
           <a:lstStyle/>
           <a:p>
             <a:r>
-              <a:rPr lang="en-US" dirty="0" smtClean="0"/>
+              <a:rPr lang="en-US" smtClean="0"/>
               <a:t>Additional Info</a:t>
             </a:r>
-            <a:endParaRPr lang="en-US" dirty="0"/>
+            <a:endParaRPr lang="en-US"/>
           </a:p>
         </p:txBody>
       </p:sp>
@@ -5109,239 +5158,222 @@
         <p:spPr/>
         <p:txBody>
           <a:bodyPr>
-            <a:normAutofit fontScale="62500" lnSpcReduction="20000"/>
+            <a:normAutofit fontScale="77500" lnSpcReduction="20000"/>
           </a:bodyPr>
           <a:lstStyle/>
           <a:p>
             <a:r>
-              <a:rPr lang="en-US" dirty="0" smtClean="0"/>
+              <a:rPr lang="en-US" smtClean="0"/>
               <a:t>Free </a:t>
             </a:r>
             <a:r>
-              <a:rPr lang="en-US" dirty="0" err="1" smtClean="0"/>
+              <a:rPr lang="en-US" err="1" smtClean="0"/>
               <a:t>iBooks</a:t>
             </a:r>
-            <a:endParaRPr lang="en-US" dirty="0" smtClean="0"/>
+            <a:endParaRPr lang="en-US" smtClean="0"/>
           </a:p>
           <a:p>
             <a:pPr lvl="1"/>
             <a:r>
-              <a:rPr lang="en-US" dirty="0" smtClean="0"/>
+              <a:rPr lang="en-US" smtClean="0"/>
               <a:t>The </a:t>
             </a:r>
             <a:r>
-              <a:rPr lang="en-US" dirty="0"/>
+              <a:rPr lang="en-US" smtClean="0"/>
               <a:t>Swift Programming </a:t>
             </a:r>
             <a:r>
-              <a:rPr lang="en-US" dirty="0" smtClean="0"/>
-              <a:t>Language (Swift 2.2)</a:t>
+              <a:rPr lang="en-US" smtClean="0"/>
+              <a:t>Language</a:t>
             </a:r>
             <a:br>
-              <a:rPr lang="en-US" dirty="0" smtClean="0"/>
+              <a:rPr lang="en-US" smtClean="0"/>
             </a:br>
             <a:r>
-              <a:rPr lang="en-US" dirty="0">
+              <a:rPr lang="en-US" smtClean="0">
                 <a:hlinkClick r:id="rId2"/>
               </a:rPr>
-              <a:t>https://</a:t>
-            </a:r>
-            <a:r>
-              <a:rPr lang="en-US" dirty="0" smtClean="0">
+              <a:t>https</a:t>
+            </a:r>
+            <a:r>
+              <a:rPr lang="en-US">
                 <a:hlinkClick r:id="rId2"/>
               </a:rPr>
-              <a:t>goo.gl/H9L7pS</a:t>
-            </a:r>
-            <a:endParaRPr lang="en-US" dirty="0" smtClean="0"/>
+              <a:t>://</a:t>
+            </a:r>
+            <a:r>
+              <a:rPr lang="en-US" smtClean="0">
+                <a:hlinkClick r:id="rId2"/>
+              </a:rPr>
+              <a:t>goo.gl/V8iJly</a:t>
+            </a:r>
+            <a:endParaRPr lang="en-US" smtClean="0"/>
           </a:p>
           <a:p>
             <a:pPr lvl="1"/>
             <a:r>
-              <a:rPr lang="en-US" dirty="0" smtClean="0"/>
-              <a:t>The Swift Programming Language </a:t>
-            </a:r>
-            <a:r>
-              <a:rPr lang="en-US" dirty="0"/>
-              <a:t>(Swift 3.0 beta)</a:t>
+              <a:rPr lang="en-US" smtClean="0"/>
+              <a:t>Using </a:t>
+            </a:r>
+            <a:r>
+              <a:rPr lang="en-US" smtClean="0"/>
+              <a:t>Swift with Cocoa </a:t>
+            </a:r>
+            <a:r>
+              <a:rPr lang="en-US"/>
+              <a:t>and Objective-C</a:t>
             </a:r>
             <a:br>
-              <a:rPr lang="en-US" dirty="0"/>
+              <a:rPr lang="en-US"/>
             </a:br>
             <a:r>
-              <a:rPr lang="en-US" dirty="0">
+              <a:rPr lang="en-US" smtClean="0">
                 <a:hlinkClick r:id="rId3"/>
               </a:rPr>
-              <a:t>https://</a:t>
-            </a:r>
-            <a:r>
-              <a:rPr lang="en-US" dirty="0" smtClean="0">
+              <a:t>https</a:t>
+            </a:r>
+            <a:r>
+              <a:rPr lang="en-US">
                 <a:hlinkClick r:id="rId3"/>
               </a:rPr>
-              <a:t>goo.gl/TJDNLm</a:t>
-            </a:r>
-            <a:endParaRPr lang="en-US" dirty="0" smtClean="0"/>
+              <a:t>://</a:t>
+            </a:r>
+            <a:r>
+              <a:rPr lang="en-US" smtClean="0">
+                <a:hlinkClick r:id="rId3"/>
+              </a:rPr>
+              <a:t>goo.gl/nKrwiX</a:t>
+            </a:r>
+            <a:endParaRPr lang="en-US" smtClean="0"/>
+          </a:p>
+          <a:p>
+            <a:r>
+              <a:rPr lang="en-US" smtClean="0"/>
+              <a:t>Links</a:t>
+            </a:r>
           </a:p>
           <a:p>
             <a:pPr lvl="1"/>
             <a:r>
-              <a:rPr lang="en-US" dirty="0" smtClean="0"/>
-              <a:t>Using Swift with Cocoa </a:t>
-            </a:r>
-            <a:r>
-              <a:rPr lang="en-US" dirty="0"/>
-              <a:t>and Objective-C</a:t>
+              <a:rPr lang="en-US" err="1" smtClean="0"/>
+              <a:t>Swift.org</a:t>
+            </a:r>
+            <a:r>
+              <a:rPr lang="en-US"/>
+              <a:t/>
             </a:r>
             <a:br>
-              <a:rPr lang="en-US" dirty="0"/>
+              <a:rPr lang="en-US"/>
             </a:br>
             <a:r>
-              <a:rPr lang="en-US" dirty="0" smtClean="0">
+              <a:rPr lang="en-US" smtClean="0">
                 <a:hlinkClick r:id="rId4"/>
               </a:rPr>
               <a:t>https</a:t>
             </a:r>
             <a:r>
-              <a:rPr lang="en-US" dirty="0">
+              <a:rPr lang="en-US">
                 <a:hlinkClick r:id="rId4"/>
               </a:rPr>
               <a:t>://</a:t>
             </a:r>
             <a:r>
-              <a:rPr lang="en-US" dirty="0" smtClean="0">
+              <a:rPr lang="en-US" smtClean="0">
                 <a:hlinkClick r:id="rId4"/>
               </a:rPr>
-              <a:t>goo.gl/nKrwiX</a:t>
-            </a:r>
-            <a:endParaRPr lang="en-US" dirty="0" smtClean="0"/>
-          </a:p>
-          <a:p>
-            <a:r>
-              <a:rPr lang="en-US" dirty="0" smtClean="0"/>
-              <a:t>Links</a:t>
-            </a:r>
+              <a:t>swift.org</a:t>
+            </a:r>
+            <a:endParaRPr lang="en-US" smtClean="0"/>
           </a:p>
           <a:p>
             <a:pPr lvl="1"/>
             <a:r>
-              <a:rPr lang="en-US" dirty="0" err="1" smtClean="0"/>
-              <a:t>Swift.org</a:t>
-            </a:r>
-            <a:r>
-              <a:rPr lang="en-US" dirty="0"/>
-              <a:t/>
+              <a:rPr lang="en-US"/>
+              <a:t>Swift Presentations, Documentation, and Sample Code</a:t>
             </a:r>
             <a:br>
-              <a:rPr lang="en-US" dirty="0"/>
+              <a:rPr lang="en-US"/>
             </a:br>
             <a:r>
-              <a:rPr lang="en-US" dirty="0" smtClean="0">
+              <a:rPr lang="en-US">
                 <a:hlinkClick r:id="rId5"/>
               </a:rPr>
-              <a:t>https</a:t>
-            </a:r>
-            <a:r>
-              <a:rPr lang="en-US" dirty="0">
+              <a:t>https://developer.apple.com/swift/resources</a:t>
+            </a:r>
+            <a:r>
+              <a:rPr lang="en-US" smtClean="0">
                 <a:hlinkClick r:id="rId5"/>
               </a:rPr>
-              <a:t>://</a:t>
-            </a:r>
-            <a:r>
-              <a:rPr lang="en-US" dirty="0" smtClean="0">
-                <a:hlinkClick r:id="rId5"/>
-              </a:rPr>
-              <a:t>swift.org</a:t>
-            </a:r>
-            <a:endParaRPr lang="en-US" dirty="0" smtClean="0"/>
+              <a:t>/</a:t>
+            </a:r>
+            <a:endParaRPr lang="en-US" smtClean="0"/>
           </a:p>
           <a:p>
             <a:pPr lvl="1"/>
             <a:r>
-              <a:rPr lang="en-US" dirty="0"/>
-              <a:t>Swift Presentations, Documentation, and Sample Code</a:t>
+              <a:rPr lang="en-US" smtClean="0"/>
+              <a:t>Hacking </a:t>
+            </a:r>
+            <a:r>
+              <a:rPr lang="en-US"/>
+              <a:t>with Swift</a:t>
             </a:r>
             <a:br>
-              <a:rPr lang="en-US" dirty="0"/>
+              <a:rPr lang="en-US"/>
             </a:br>
             <a:r>
-              <a:rPr lang="en-US" dirty="0">
+              <a:rPr lang="en-US">
                 <a:hlinkClick r:id="rId6"/>
               </a:rPr>
-              <a:t>https://developer.apple.com/swift/resources</a:t>
-            </a:r>
-            <a:r>
-              <a:rPr lang="en-US" dirty="0" smtClean="0">
+              <a:t>https://</a:t>
+            </a:r>
+            <a:r>
+              <a:rPr lang="en-US" smtClean="0">
                 <a:hlinkClick r:id="rId6"/>
               </a:rPr>
-              <a:t>/</a:t>
-            </a:r>
-            <a:endParaRPr lang="en-US" dirty="0" smtClean="0"/>
+              <a:t>www.hackingwithswift.com</a:t>
+            </a:r>
+            <a:endParaRPr lang="en-US" smtClean="0"/>
           </a:p>
           <a:p>
             <a:pPr lvl="1"/>
             <a:r>
-              <a:rPr lang="en-US" dirty="0" smtClean="0"/>
-              <a:t>Hacking </a:t>
-            </a:r>
-            <a:r>
-              <a:rPr lang="en-US" dirty="0"/>
-              <a:t>with Swift</a:t>
+              <a:rPr lang="en-US" smtClean="0"/>
+              <a:t>Swift </a:t>
+            </a:r>
+            <a:r>
+              <a:rPr lang="en-US"/>
+              <a:t>Weekly Newsletter</a:t>
             </a:r>
             <a:br>
-              <a:rPr lang="en-US" dirty="0"/>
+              <a:rPr lang="en-US"/>
             </a:br>
             <a:r>
-              <a:rPr lang="en-US" dirty="0">
+              <a:rPr lang="en-US" smtClean="0">
                 <a:hlinkClick r:id="rId7"/>
               </a:rPr>
-              <a:t>https://</a:t>
-            </a:r>
-            <a:r>
-              <a:rPr lang="en-US" dirty="0" smtClean="0">
+              <a:t>http</a:t>
+            </a:r>
+            <a:r>
+              <a:rPr lang="en-US">
                 <a:hlinkClick r:id="rId7"/>
               </a:rPr>
-              <a:t>www.hackingwithswift.com</a:t>
-            </a:r>
-            <a:endParaRPr lang="en-US" dirty="0" smtClean="0"/>
-          </a:p>
-          <a:p>
-            <a:pPr lvl="1"/>
-            <a:r>
-              <a:rPr lang="en-US" dirty="0" smtClean="0"/>
-              <a:t>Swift </a:t>
-            </a:r>
-            <a:r>
-              <a:rPr lang="en-US" dirty="0"/>
-              <a:t>Weekly Newsletter</a:t>
-            </a:r>
-            <a:br>
-              <a:rPr lang="en-US" dirty="0"/>
-            </a:br>
-            <a:r>
-              <a:rPr lang="en-US" dirty="0" smtClean="0">
-                <a:hlinkClick r:id="rId8"/>
-              </a:rPr>
-              <a:t>http</a:t>
-            </a:r>
-            <a:r>
-              <a:rPr lang="en-US" dirty="0">
-                <a:hlinkClick r:id="rId8"/>
-              </a:rPr>
               <a:t>://</a:t>
             </a:r>
             <a:r>
-              <a:rPr lang="en-US" dirty="0" smtClean="0">
-                <a:hlinkClick r:id="rId8"/>
+              <a:rPr lang="en-US" smtClean="0">
+                <a:hlinkClick r:id="rId7"/>
               </a:rPr>
               <a:t>www.swiftweekly.com</a:t>
             </a:r>
-            <a:endParaRPr lang="en-US" dirty="0" smtClean="0"/>
+            <a:endParaRPr lang="en-US" smtClean="0"/>
           </a:p>
           <a:p>
             <a:pPr lvl="1"/>
-            <a:endParaRPr lang="en-US" dirty="0" smtClean="0"/>
-          </a:p>
-          <a:p>
-            <a:endParaRPr lang="en-US" dirty="0"/>
+            <a:endParaRPr lang="en-US" smtClean="0"/>
+          </a:p>
+          <a:p>
+            <a:endParaRPr lang="en-US"/>
           </a:p>
         </p:txBody>
       </p:sp>
@@ -5400,10 +5432,10 @@
           <a:lstStyle/>
           <a:p>
             <a:r>
-              <a:rPr lang="en-US" dirty="0" smtClean="0"/>
+              <a:rPr lang="en-US" smtClean="0"/>
               <a:t>Questions?</a:t>
             </a:r>
-            <a:endParaRPr lang="en-US" dirty="0"/>
+            <a:endParaRPr lang="en-US"/>
           </a:p>
         </p:txBody>
       </p:sp>
@@ -5425,156 +5457,156 @@
           <a:lstStyle/>
           <a:p>
             <a:r>
-              <a:rPr lang="en-US" dirty="0" smtClean="0"/>
+              <a:rPr lang="en-US" smtClean="0"/>
               <a:t>Email:</a:t>
             </a:r>
             <a:br>
-              <a:rPr lang="en-US" dirty="0" smtClean="0"/>
+              <a:rPr lang="en-US" smtClean="0"/>
             </a:br>
             <a:r>
-              <a:rPr lang="en-US" dirty="0" smtClean="0">
+              <a:rPr lang="en-US" smtClean="0">
                 <a:hlinkClick r:id="rId2"/>
               </a:rPr>
               <a:t>keith.wedinger@improving.com</a:t>
             </a:r>
-            <a:endParaRPr lang="en-US" dirty="0" smtClean="0"/>
-          </a:p>
-          <a:p>
-            <a:r>
-              <a:rPr lang="en-US" dirty="0"/>
+            <a:endParaRPr lang="en-US" smtClean="0"/>
+          </a:p>
+          <a:p>
+            <a:r>
+              <a:rPr lang="en-US"/>
               <a:t>Blog:</a:t>
             </a:r>
             <a:br>
-              <a:rPr lang="en-US" dirty="0"/>
+              <a:rPr lang="en-US"/>
             </a:br>
             <a:r>
-              <a:rPr lang="en-US" dirty="0" smtClean="0">
+              <a:rPr lang="en-US" smtClean="0">
                 <a:hlinkClick r:id="rId3"/>
               </a:rPr>
               <a:t>https</a:t>
             </a:r>
             <a:r>
-              <a:rPr lang="en-US" dirty="0">
+              <a:rPr lang="en-US">
                 <a:hlinkClick r:id="rId3"/>
               </a:rPr>
               <a:t>://</a:t>
             </a:r>
             <a:r>
-              <a:rPr lang="en-US" dirty="0" smtClean="0">
+              <a:rPr lang="en-US" smtClean="0">
                 <a:hlinkClick r:id="rId3"/>
               </a:rPr>
               <a:t>jkwuc89.github.io</a:t>
             </a:r>
-            <a:endParaRPr lang="en-US" dirty="0" smtClean="0"/>
-          </a:p>
-          <a:p>
-            <a:r>
-              <a:rPr lang="en-US" dirty="0" smtClean="0"/>
+            <a:endParaRPr lang="en-US" smtClean="0"/>
+          </a:p>
+          <a:p>
+            <a:r>
+              <a:rPr lang="en-US" smtClean="0"/>
               <a:t>Twitter:</a:t>
             </a:r>
             <a:br>
-              <a:rPr lang="en-US" dirty="0" smtClean="0"/>
+              <a:rPr lang="en-US" smtClean="0"/>
             </a:br>
             <a:r>
-              <a:rPr lang="en-US" dirty="0" smtClean="0"/>
+              <a:rPr lang="en-US" smtClean="0"/>
               <a:t>@jkwuc89</a:t>
             </a:r>
           </a:p>
           <a:p>
             <a:r>
-              <a:rPr lang="en-US" dirty="0" smtClean="0"/>
+              <a:rPr lang="en-US" smtClean="0"/>
               <a:t>GitHub:</a:t>
             </a:r>
             <a:r>
-              <a:rPr lang="en-US" dirty="0"/>
+              <a:rPr lang="en-US"/>
               <a:t/>
             </a:r>
             <a:br>
-              <a:rPr lang="en-US" dirty="0"/>
+              <a:rPr lang="en-US"/>
             </a:br>
             <a:r>
-              <a:rPr lang="en-US" dirty="0" smtClean="0">
+              <a:rPr lang="en-US" smtClean="0">
                 <a:hlinkClick r:id="rId4"/>
               </a:rPr>
               <a:t>https</a:t>
             </a:r>
             <a:r>
-              <a:rPr lang="en-US" dirty="0">
+              <a:rPr lang="en-US">
                 <a:hlinkClick r:id="rId4"/>
               </a:rPr>
               <a:t>://</a:t>
             </a:r>
             <a:r>
-              <a:rPr lang="en-US" dirty="0" smtClean="0">
+              <a:rPr lang="en-US" smtClean="0">
                 <a:hlinkClick r:id="rId4"/>
               </a:rPr>
               <a:t>github.com/jkwuc89</a:t>
             </a:r>
-            <a:endParaRPr lang="en-US" dirty="0" smtClean="0"/>
-          </a:p>
-          <a:p>
-            <a:r>
-              <a:rPr lang="en-US" dirty="0" smtClean="0"/>
+            <a:endParaRPr lang="en-US" smtClean="0"/>
+          </a:p>
+          <a:p>
+            <a:r>
+              <a:rPr lang="en-US" smtClean="0"/>
               <a:t>LinkedIn</a:t>
             </a:r>
             <a:r>
-              <a:rPr lang="en-US" dirty="0"/>
+              <a:rPr lang="en-US"/>
               <a:t/>
             </a:r>
             <a:br>
-              <a:rPr lang="en-US" dirty="0"/>
+              <a:rPr lang="en-US"/>
             </a:br>
             <a:r>
-              <a:rPr lang="en-US" dirty="0" smtClean="0">
+              <a:rPr lang="en-US" smtClean="0">
                 <a:hlinkClick r:id="rId5"/>
               </a:rPr>
               <a:t>https</a:t>
             </a:r>
             <a:r>
-              <a:rPr lang="en-US" dirty="0">
+              <a:rPr lang="en-US">
                 <a:hlinkClick r:id="rId5"/>
               </a:rPr>
               <a:t>://</a:t>
             </a:r>
             <a:r>
-              <a:rPr lang="en-US" dirty="0" smtClean="0">
+              <a:rPr lang="en-US" smtClean="0">
                 <a:hlinkClick r:id="rId5"/>
               </a:rPr>
               <a:t>www.linkedin.com/in/kwedinger</a:t>
             </a:r>
-            <a:endParaRPr lang="en-US" dirty="0" smtClean="0"/>
-          </a:p>
-          <a:p>
-            <a:r>
-              <a:rPr lang="en-US" dirty="0" smtClean="0"/>
+            <a:endParaRPr lang="en-US" smtClean="0"/>
+          </a:p>
+          <a:p>
+            <a:r>
+              <a:rPr lang="en-US" smtClean="0"/>
               <a:t>Untapped (for fellow craft </a:t>
             </a:r>
             <a:r>
-              <a:rPr lang="en-US" dirty="0"/>
+              <a:rPr lang="en-US"/>
               <a:t>beer aficionados)</a:t>
             </a:r>
             <a:br>
-              <a:rPr lang="en-US" dirty="0"/>
+              <a:rPr lang="en-US"/>
             </a:br>
             <a:r>
-              <a:rPr lang="en-US" dirty="0" smtClean="0">
+              <a:rPr lang="en-US" smtClean="0">
                 <a:hlinkClick r:id="rId6"/>
               </a:rPr>
               <a:t>https</a:t>
             </a:r>
             <a:r>
-              <a:rPr lang="en-US" dirty="0">
+              <a:rPr lang="en-US">
                 <a:hlinkClick r:id="rId6"/>
               </a:rPr>
               <a:t>://</a:t>
             </a:r>
             <a:r>
-              <a:rPr lang="en-US" dirty="0" smtClean="0">
+              <a:rPr lang="en-US" smtClean="0">
                 <a:hlinkClick r:id="rId6"/>
               </a:rPr>
               <a:t>untappd.com/user/jkwuc89</a:t>
             </a:r>
-            <a:endParaRPr lang="en-US" dirty="0" smtClean="0"/>
+            <a:endParaRPr lang="en-US" smtClean="0"/>
           </a:p>
         </p:txBody>
       </p:sp>

</xml_diff>

<commit_message>
Presentation updates for recent conferences includes new version of documentation presentation for Columbus Code Camp 2017
</commit_message>
<xml_diff>
--- a/A Swift Introduction to Swift.pptx
+++ b/A Swift Introduction to Swift.pptx
@@ -215,7 +215,7 @@
           <a:p>
             <a:fld id="{DE4C9721-1813-4A55-A5DA-76417DB5EE62}" type="datetimeFigureOut">
               <a:rPr lang="en-US" smtClean="0"/>
-              <a:t>10/20/16</a:t>
+              <a:t>6/4/17</a:t>
             </a:fld>
             <a:endParaRPr lang="en-US"/>
           </a:p>
@@ -797,7 +797,7 @@
           <a:p>
             <a:fld id="{1A6A9824-C09F-4166-9A2C-6C9FA577887A}" type="datetimeFigureOut">
               <a:rPr lang="en-US" smtClean="0"/>
-              <a:t>10/20/16</a:t>
+              <a:t>6/4/17</a:t>
             </a:fld>
             <a:endParaRPr lang="en-US"/>
           </a:p>
@@ -1007,7 +1007,7 @@
           <a:p>
             <a:fld id="{2A7CB402-B72D-3346-9EA5-354251120F9E}" type="datetimeFigureOut">
               <a:rPr lang="en-US" smtClean="0"/>
-              <a:t>10/20/16</a:t>
+              <a:t>6/4/17</a:t>
             </a:fld>
             <a:endParaRPr lang="en-US"/>
           </a:p>
@@ -1168,7 +1168,7 @@
           <a:p>
             <a:fld id="{2A7CB402-B72D-3346-9EA5-354251120F9E}" type="datetimeFigureOut">
               <a:rPr lang="en-US" smtClean="0"/>
-              <a:t>10/20/16</a:t>
+              <a:t>6/4/17</a:t>
             </a:fld>
             <a:endParaRPr lang="en-US"/>
           </a:p>
@@ -1391,7 +1391,7 @@
           <a:p>
             <a:fld id="{2A7CB402-B72D-3346-9EA5-354251120F9E}" type="datetimeFigureOut">
               <a:rPr lang="en-US" smtClean="0"/>
-              <a:t>10/20/16</a:t>
+              <a:t>6/4/17</a:t>
             </a:fld>
             <a:endParaRPr lang="en-US"/>
           </a:p>
@@ -1730,7 +1730,7 @@
           <a:p>
             <a:fld id="{2A7CB402-B72D-3346-9EA5-354251120F9E}" type="datetimeFigureOut">
               <a:rPr lang="en-US" smtClean="0"/>
-              <a:t>10/20/16</a:t>
+              <a:t>6/4/17</a:t>
             </a:fld>
             <a:endParaRPr lang="en-US"/>
           </a:p>
@@ -2108,7 +2108,7 @@
           <a:p>
             <a:fld id="{2A7CB402-B72D-3346-9EA5-354251120F9E}" type="datetimeFigureOut">
               <a:rPr lang="en-US" smtClean="0"/>
-              <a:t>10/20/16</a:t>
+              <a:t>6/4/17</a:t>
             </a:fld>
             <a:endParaRPr lang="en-US"/>
           </a:p>
@@ -2624,7 +2624,7 @@
           <a:p>
             <a:fld id="{2A7CB402-B72D-3346-9EA5-354251120F9E}" type="datetimeFigureOut">
               <a:rPr lang="en-US" smtClean="0"/>
-              <a:t>10/20/16</a:t>
+              <a:t>6/4/17</a:t>
             </a:fld>
             <a:endParaRPr lang="en-US"/>
           </a:p>
@@ -2792,7 +2792,7 @@
           <a:p>
             <a:fld id="{2A7CB402-B72D-3346-9EA5-354251120F9E}" type="datetimeFigureOut">
               <a:rPr lang="en-US" smtClean="0"/>
-              <a:t>10/20/16</a:t>
+              <a:t>6/4/17</a:t>
             </a:fld>
             <a:endParaRPr lang="en-US"/>
           </a:p>
@@ -2922,7 +2922,7 @@
           <a:p>
             <a:fld id="{2A7CB402-B72D-3346-9EA5-354251120F9E}" type="datetimeFigureOut">
               <a:rPr lang="en-US" smtClean="0"/>
-              <a:t>10/20/16</a:t>
+              <a:t>6/4/17</a:t>
             </a:fld>
             <a:endParaRPr lang="en-US"/>
           </a:p>
@@ -3270,7 +3270,7 @@
           <a:p>
             <a:fld id="{2A7CB402-B72D-3346-9EA5-354251120F9E}" type="datetimeFigureOut">
               <a:rPr lang="en-US" smtClean="0"/>
-              <a:t>10/20/16</a:t>
+              <a:t>6/4/17</a:t>
             </a:fld>
             <a:endParaRPr lang="en-US"/>
           </a:p>
@@ -3584,7 +3584,7 @@
           <a:p>
             <a:fld id="{2A7CB402-B72D-3346-9EA5-354251120F9E}" type="datetimeFigureOut">
               <a:rPr lang="en-US" smtClean="0"/>
-              <a:t>10/20/16</a:t>
+              <a:t>6/4/17</a:t>
             </a:fld>
             <a:endParaRPr lang="en-US"/>
           </a:p>
@@ -3808,7 +3808,7 @@
           <a:p>
             <a:fld id="{2A7CB402-B72D-3346-9EA5-354251120F9E}" type="datetimeFigureOut">
               <a:rPr lang="en-US" smtClean="0"/>
-              <a:t>10/20/16</a:t>
+              <a:t>6/4/17</a:t>
             </a:fld>
             <a:endParaRPr lang="en-US"/>
           </a:p>
@@ -4266,50 +4266,54 @@
               <a:rPr lang="en-US" dirty="0" err="1" smtClean="0"/>
               <a:t>Structs</a:t>
             </a:r>
-            <a:endParaRPr lang="en-US" smtClean="0"/>
+            <a:endParaRPr lang="en-US" dirty="0" smtClean="0"/>
           </a:p>
           <a:p>
             <a:pPr lvl="1"/>
             <a:r>
-              <a:rPr lang="en-US" smtClean="0"/>
+              <a:rPr lang="en-US" dirty="0" smtClean="0"/>
               <a:t>Error Handling</a:t>
             </a:r>
-            <a:endParaRPr lang="en-US"/>
+            <a:endParaRPr lang="en-US" dirty="0"/>
           </a:p>
           <a:p>
             <a:pPr lvl="1"/>
             <a:r>
-              <a:rPr lang="en-US"/>
+              <a:rPr lang="en-US" dirty="0"/>
               <a:t>Functions and Closures</a:t>
             </a:r>
           </a:p>
           <a:p>
             <a:pPr lvl="1"/>
             <a:r>
-              <a:rPr lang="en-US"/>
+              <a:rPr lang="en-US" dirty="0"/>
               <a:t>Variables </a:t>
             </a:r>
             <a:r>
-              <a:rPr lang="en-US" smtClean="0"/>
+              <a:rPr lang="en-US" dirty="0" smtClean="0"/>
               <a:t>Constants </a:t>
             </a:r>
             <a:r>
-              <a:rPr lang="en-US"/>
+              <a:rPr lang="en-US" dirty="0"/>
               <a:t>Types and Operators</a:t>
             </a:r>
           </a:p>
           <a:p>
             <a:r>
-              <a:rPr lang="en-US" smtClean="0"/>
-              <a:t>Xcode 8</a:t>
-            </a:r>
-            <a:endParaRPr lang="en-US" smtClean="0"/>
+              <a:rPr lang="en-US" dirty="0" smtClean="0"/>
+              <a:t>Xcode </a:t>
+            </a:r>
+            <a:r>
+              <a:rPr lang="en-US" dirty="0" smtClean="0"/>
+              <a:t>8.3.2</a:t>
+            </a:r>
+            <a:endParaRPr lang="en-US" dirty="0" smtClean="0"/>
           </a:p>
           <a:p>
             <a:pPr marL="0" indent="0">
               <a:buNone/>
             </a:pPr>
-            <a:endParaRPr lang="en-US"/>
+            <a:endParaRPr lang="en-US" dirty="0"/>
           </a:p>
         </p:txBody>
       </p:sp>
@@ -4361,22 +4365,26 @@
           <a:lstStyle/>
           <a:p>
             <a:r>
-              <a:rPr lang="en-US"/>
+              <a:rPr lang="en-US" dirty="0"/>
               <a:t>A S</a:t>
             </a:r>
             <a:r>
-              <a:rPr lang="en-US" smtClean="0"/>
+              <a:rPr lang="en-US" dirty="0" smtClean="0"/>
               <a:t>wift Introduction </a:t>
             </a:r>
             <a:r>
-              <a:rPr lang="en-US"/>
+              <a:rPr lang="en-US" dirty="0"/>
               <a:t>to </a:t>
             </a:r>
             <a:r>
-              <a:rPr lang="en-US" smtClean="0"/>
-              <a:t>Swift (pun intended)</a:t>
-            </a:r>
-            <a:endParaRPr lang="en-US"/>
+              <a:rPr lang="en-US" dirty="0" smtClean="0"/>
+              <a:t>Swift </a:t>
+            </a:r>
+            <a:r>
+              <a:rPr lang="en-US" dirty="0" smtClean="0"/>
+              <a:t>(pun intended)</a:t>
+            </a:r>
+            <a:endParaRPr lang="en-US" dirty="0"/>
           </a:p>
         </p:txBody>
       </p:sp>
@@ -4498,11 +4506,7 @@
           <a:p>
             <a:r>
               <a:rPr lang="en-US" sz="2200" dirty="0" smtClean="0"/>
-              <a:t>Over </a:t>
-            </a:r>
-            <a:r>
-              <a:rPr lang="en-US" sz="2200" dirty="0" smtClean="0"/>
-              <a:t>27 </a:t>
+              <a:t>Over 27 </a:t>
             </a:r>
             <a:r>
               <a:rPr lang="en-US" sz="2200" dirty="0"/>
@@ -4903,11 +4907,7 @@
           <a:p>
             <a:r>
               <a:rPr lang="en-US" smtClean="0"/>
-              <a:t>Static properties and </a:t>
-            </a:r>
-            <a:r>
-              <a:rPr lang="en-US" smtClean="0"/>
-              <a:t>methods</a:t>
+              <a:t>Static properties and methods</a:t>
             </a:r>
           </a:p>
           <a:p>
@@ -4915,7 +4915,6 @@
               <a:rPr lang="en-US" smtClean="0"/>
               <a:t>Error Handling</a:t>
             </a:r>
-            <a:endParaRPr lang="en-US" smtClean="0"/>
           </a:p>
         </p:txBody>
       </p:sp>
@@ -5055,7 +5054,6 @@
               <a:rPr lang="en-US" smtClean="0"/>
               <a:t>Error Handling</a:t>
             </a:r>
-            <a:endParaRPr lang="en-US" smtClean="0"/>
           </a:p>
           <a:p>
             <a:pPr lvl="1"/>
@@ -5176,15 +5174,7 @@
             <a:pPr lvl="1"/>
             <a:r>
               <a:rPr lang="en-US" smtClean="0"/>
-              <a:t>The </a:t>
-            </a:r>
-            <a:r>
-              <a:rPr lang="en-US" smtClean="0"/>
-              <a:t>Swift Programming </a:t>
-            </a:r>
-            <a:r>
-              <a:rPr lang="en-US" smtClean="0"/>
-              <a:t>Language</a:t>
+              <a:t>The Swift Programming Language</a:t>
             </a:r>
             <a:br>
               <a:rPr lang="en-US" smtClean="0"/>
@@ -5213,11 +5203,7 @@
             <a:pPr lvl="1"/>
             <a:r>
               <a:rPr lang="en-US" smtClean="0"/>
-              <a:t>Using </a:t>
-            </a:r>
-            <a:r>
-              <a:rPr lang="en-US" smtClean="0"/>
-              <a:t>Swift with Cocoa </a:t>
+              <a:t>Using Swift with Cocoa </a:t>
             </a:r>
             <a:r>
               <a:rPr lang="en-US"/>

</xml_diff>